<commit_message>
start week 13 lecture
</commit_message>
<xml_diff>
--- a/infrastructure-week-3.pptx
+++ b/infrastructure-week-3.pptx
@@ -18,37 +18,40 @@
     <p:sldId id="268" r:id="rId12"/>
     <p:sldId id="267" r:id="rId13"/>
     <p:sldId id="269" r:id="rId14"/>
-    <p:sldId id="270" r:id="rId15"/>
-    <p:sldId id="271" r:id="rId16"/>
-    <p:sldId id="272" r:id="rId17"/>
-    <p:sldId id="273" r:id="rId18"/>
-    <p:sldId id="274" r:id="rId19"/>
-    <p:sldId id="279" r:id="rId20"/>
-    <p:sldId id="280" r:id="rId21"/>
-    <p:sldId id="281" r:id="rId22"/>
-    <p:sldId id="282" r:id="rId23"/>
-    <p:sldId id="283" r:id="rId24"/>
-    <p:sldId id="275" r:id="rId25"/>
-    <p:sldId id="276" r:id="rId26"/>
-    <p:sldId id="277" r:id="rId27"/>
-    <p:sldId id="284" r:id="rId28"/>
-    <p:sldId id="285" r:id="rId29"/>
-    <p:sldId id="286" r:id="rId30"/>
-    <p:sldId id="287" r:id="rId31"/>
-    <p:sldId id="289" r:id="rId32"/>
-    <p:sldId id="290" r:id="rId33"/>
-    <p:sldId id="288" r:id="rId34"/>
-    <p:sldId id="291" r:id="rId35"/>
-    <p:sldId id="292" r:id="rId36"/>
-    <p:sldId id="293" r:id="rId37"/>
-    <p:sldId id="294" r:id="rId38"/>
-    <p:sldId id="295" r:id="rId39"/>
-    <p:sldId id="296" r:id="rId40"/>
-    <p:sldId id="297" r:id="rId41"/>
-    <p:sldId id="298" r:id="rId42"/>
-    <p:sldId id="300" r:id="rId43"/>
-    <p:sldId id="299" r:id="rId44"/>
-    <p:sldId id="278" r:id="rId45"/>
+    <p:sldId id="303" r:id="rId15"/>
+    <p:sldId id="304" r:id="rId16"/>
+    <p:sldId id="270" r:id="rId17"/>
+    <p:sldId id="271" r:id="rId18"/>
+    <p:sldId id="272" r:id="rId19"/>
+    <p:sldId id="273" r:id="rId20"/>
+    <p:sldId id="274" r:id="rId21"/>
+    <p:sldId id="279" r:id="rId22"/>
+    <p:sldId id="280" r:id="rId23"/>
+    <p:sldId id="281" r:id="rId24"/>
+    <p:sldId id="282" r:id="rId25"/>
+    <p:sldId id="283" r:id="rId26"/>
+    <p:sldId id="275" r:id="rId27"/>
+    <p:sldId id="276" r:id="rId28"/>
+    <p:sldId id="302" r:id="rId29"/>
+    <p:sldId id="277" r:id="rId30"/>
+    <p:sldId id="284" r:id="rId31"/>
+    <p:sldId id="285" r:id="rId32"/>
+    <p:sldId id="286" r:id="rId33"/>
+    <p:sldId id="287" r:id="rId34"/>
+    <p:sldId id="289" r:id="rId35"/>
+    <p:sldId id="290" r:id="rId36"/>
+    <p:sldId id="288" r:id="rId37"/>
+    <p:sldId id="291" r:id="rId38"/>
+    <p:sldId id="292" r:id="rId39"/>
+    <p:sldId id="293" r:id="rId40"/>
+    <p:sldId id="294" r:id="rId41"/>
+    <p:sldId id="295" r:id="rId42"/>
+    <p:sldId id="296" r:id="rId43"/>
+    <p:sldId id="297" r:id="rId44"/>
+    <p:sldId id="298" r:id="rId45"/>
+    <p:sldId id="300" r:id="rId46"/>
+    <p:sldId id="299" r:id="rId47"/>
+    <p:sldId id="278" r:id="rId48"/>
   </p:sldIdLst>
   <p:sldSz cx="9144000" cy="6858000" type="screen4x3"/>
   <p:notesSz cx="6858000" cy="9144000"/>
@@ -331,7 +334,7 @@
           <a:p>
             <a:fld id="{C721276B-38BC-F24F-B36B-D23FB353AB88}" type="datetimeFigureOut">
               <a:rPr lang="en-US" smtClean="0"/>
-              <a:t>4/11/16</a:t>
+              <a:t>4/24/16</a:t>
             </a:fld>
             <a:endParaRPr lang="en-US"/>
           </a:p>
@@ -501,7 +504,7 @@
           <a:p>
             <a:fld id="{C721276B-38BC-F24F-B36B-D23FB353AB88}" type="datetimeFigureOut">
               <a:rPr lang="en-US" smtClean="0"/>
-              <a:t>4/11/16</a:t>
+              <a:t>4/24/16</a:t>
             </a:fld>
             <a:endParaRPr lang="en-US"/>
           </a:p>
@@ -681,7 +684,7 @@
           <a:p>
             <a:fld id="{C721276B-38BC-F24F-B36B-D23FB353AB88}" type="datetimeFigureOut">
               <a:rPr lang="en-US" smtClean="0"/>
-              <a:t>4/11/16</a:t>
+              <a:t>4/24/16</a:t>
             </a:fld>
             <a:endParaRPr lang="en-US"/>
           </a:p>
@@ -851,7 +854,7 @@
           <a:p>
             <a:fld id="{C721276B-38BC-F24F-B36B-D23FB353AB88}" type="datetimeFigureOut">
               <a:rPr lang="en-US" smtClean="0"/>
-              <a:t>4/11/16</a:t>
+              <a:t>4/24/16</a:t>
             </a:fld>
             <a:endParaRPr lang="en-US"/>
           </a:p>
@@ -1097,7 +1100,7 @@
           <a:p>
             <a:fld id="{C721276B-38BC-F24F-B36B-D23FB353AB88}" type="datetimeFigureOut">
               <a:rPr lang="en-US" smtClean="0"/>
-              <a:t>4/11/16</a:t>
+              <a:t>4/24/16</a:t>
             </a:fld>
             <a:endParaRPr lang="en-US"/>
           </a:p>
@@ -1385,7 +1388,7 @@
           <a:p>
             <a:fld id="{C721276B-38BC-F24F-B36B-D23FB353AB88}" type="datetimeFigureOut">
               <a:rPr lang="en-US" smtClean="0"/>
-              <a:t>4/11/16</a:t>
+              <a:t>4/24/16</a:t>
             </a:fld>
             <a:endParaRPr lang="en-US"/>
           </a:p>
@@ -1807,7 +1810,7 @@
           <a:p>
             <a:fld id="{C721276B-38BC-F24F-B36B-D23FB353AB88}" type="datetimeFigureOut">
               <a:rPr lang="en-US" smtClean="0"/>
-              <a:t>4/11/16</a:t>
+              <a:t>4/24/16</a:t>
             </a:fld>
             <a:endParaRPr lang="en-US"/>
           </a:p>
@@ -1925,7 +1928,7 @@
           <a:p>
             <a:fld id="{C721276B-38BC-F24F-B36B-D23FB353AB88}" type="datetimeFigureOut">
               <a:rPr lang="en-US" smtClean="0"/>
-              <a:t>4/11/16</a:t>
+              <a:t>4/24/16</a:t>
             </a:fld>
             <a:endParaRPr lang="en-US"/>
           </a:p>
@@ -2020,7 +2023,7 @@
           <a:p>
             <a:fld id="{C721276B-38BC-F24F-B36B-D23FB353AB88}" type="datetimeFigureOut">
               <a:rPr lang="en-US" smtClean="0"/>
-              <a:t>4/11/16</a:t>
+              <a:t>4/24/16</a:t>
             </a:fld>
             <a:endParaRPr lang="en-US"/>
           </a:p>
@@ -2297,7 +2300,7 @@
           <a:p>
             <a:fld id="{C721276B-38BC-F24F-B36B-D23FB353AB88}" type="datetimeFigureOut">
               <a:rPr lang="en-US" smtClean="0"/>
-              <a:t>4/11/16</a:t>
+              <a:t>4/24/16</a:t>
             </a:fld>
             <a:endParaRPr lang="en-US"/>
           </a:p>
@@ -2550,7 +2553,7 @@
           <a:p>
             <a:fld id="{C721276B-38BC-F24F-B36B-D23FB353AB88}" type="datetimeFigureOut">
               <a:rPr lang="en-US" smtClean="0"/>
-              <a:t>4/11/16</a:t>
+              <a:t>4/24/16</a:t>
             </a:fld>
             <a:endParaRPr lang="en-US"/>
           </a:p>
@@ -2763,7 +2766,7 @@
           <a:p>
             <a:fld id="{C721276B-38BC-F24F-B36B-D23FB353AB88}" type="datetimeFigureOut">
               <a:rPr lang="en-US" smtClean="0"/>
-              <a:t>4/11/16</a:t>
+              <a:t>4/24/16</a:t>
             </a:fld>
             <a:endParaRPr lang="en-US"/>
           </a:p>
@@ -3880,6 +3883,204 @@
         </p:nvSpPr>
         <p:spPr/>
         <p:txBody>
+          <a:bodyPr/>
+          <a:lstStyle/>
+          <a:p>
+            <a:r>
+              <a:rPr lang="en-US" dirty="0" smtClean="0"/>
+              <a:t>Database </a:t>
+            </a:r>
+            <a:r>
+              <a:rPr lang="en-US" dirty="0" err="1" smtClean="0"/>
+              <a:t>Sharding</a:t>
+            </a:r>
+            <a:endParaRPr lang="en-US" dirty="0"/>
+          </a:p>
+        </p:txBody>
+      </p:sp>
+      <p:sp>
+        <p:nvSpPr>
+          <p:cNvPr id="3" name="Content Placeholder 2"/>
+          <p:cNvSpPr>
+            <a:spLocks noGrp="1"/>
+          </p:cNvSpPr>
+          <p:nvPr>
+            <p:ph idx="1"/>
+          </p:nvPr>
+        </p:nvSpPr>
+        <p:spPr/>
+        <p:txBody>
+          <a:bodyPr>
+            <a:normAutofit lnSpcReduction="10000"/>
+          </a:bodyPr>
+          <a:lstStyle/>
+          <a:p>
+            <a:r>
+              <a:rPr lang="en-US" dirty="0" smtClean="0"/>
+              <a:t>Partition your database into multiple slices, called shards</a:t>
+            </a:r>
+          </a:p>
+          <a:p>
+            <a:endParaRPr lang="en-US" dirty="0" smtClean="0"/>
+          </a:p>
+          <a:p>
+            <a:r>
+              <a:rPr lang="en-US" dirty="0" smtClean="0"/>
+              <a:t>Shards may be stored on separate servers</a:t>
+            </a:r>
+          </a:p>
+          <a:p>
+            <a:endParaRPr lang="en-US" dirty="0" smtClean="0"/>
+          </a:p>
+          <a:p>
+            <a:r>
+              <a:rPr lang="en-US" dirty="0" smtClean="0"/>
+              <a:t>Shards distribute load horizontally, improving performance for some operations</a:t>
+            </a:r>
+          </a:p>
+          <a:p>
+            <a:pPr lvl="1"/>
+            <a:r>
+              <a:rPr lang="en-US" dirty="0" smtClean="0"/>
+              <a:t>Improved write and indexing performance</a:t>
+            </a:r>
+          </a:p>
+          <a:p>
+            <a:pPr lvl="1"/>
+            <a:r>
+              <a:rPr lang="en-US" dirty="0" smtClean="0"/>
+              <a:t>Potential challenges rebalancing data on shards</a:t>
+            </a:r>
+          </a:p>
+          <a:p>
+            <a:pPr lvl="1"/>
+            <a:endParaRPr lang="en-US" dirty="0"/>
+          </a:p>
+        </p:txBody>
+      </p:sp>
+    </p:spTree>
+    <p:extLst>
+      <p:ext uri="{BB962C8B-B14F-4D97-AF65-F5344CB8AC3E}">
+        <p14:creationId xmlns:p14="http://schemas.microsoft.com/office/powerpoint/2010/main" val="3624715713"/>
+      </p:ext>
+    </p:extLst>
+  </p:cSld>
+  <p:clrMapOvr>
+    <a:masterClrMapping/>
+  </p:clrMapOvr>
+</p:sld>
+</file>
+
+<file path=ppt/slides/slide15.xml><?xml version="1.0" encoding="utf-8"?>
+<p:sld xmlns:a="http://schemas.openxmlformats.org/drawingml/2006/main" xmlns:r="http://schemas.openxmlformats.org/officeDocument/2006/relationships" xmlns:p="http://schemas.openxmlformats.org/presentationml/2006/main">
+  <p:cSld>
+    <p:spTree>
+      <p:nvGrpSpPr>
+        <p:cNvPr id="1" name=""/>
+        <p:cNvGrpSpPr/>
+        <p:nvPr/>
+      </p:nvGrpSpPr>
+      <p:grpSpPr>
+        <a:xfrm>
+          <a:off x="0" y="0"/>
+          <a:ext cx="0" cy="0"/>
+          <a:chOff x="0" y="0"/>
+          <a:chExt cx="0" cy="0"/>
+        </a:xfrm>
+      </p:grpSpPr>
+      <p:sp>
+        <p:nvSpPr>
+          <p:cNvPr id="2" name="Title 1"/>
+          <p:cNvSpPr>
+            <a:spLocks noGrp="1"/>
+          </p:cNvSpPr>
+          <p:nvPr>
+            <p:ph type="title"/>
+          </p:nvPr>
+        </p:nvSpPr>
+        <p:spPr/>
+        <p:txBody>
+          <a:bodyPr/>
+          <a:lstStyle/>
+          <a:p>
+            <a:r>
+              <a:rPr lang="en-US" dirty="0" smtClean="0"/>
+              <a:t>Database </a:t>
+            </a:r>
+            <a:r>
+              <a:rPr lang="en-US" dirty="0" err="1" smtClean="0"/>
+              <a:t>Sharding</a:t>
+            </a:r>
+            <a:endParaRPr lang="en-US" dirty="0"/>
+          </a:p>
+        </p:txBody>
+      </p:sp>
+      <p:pic>
+        <p:nvPicPr>
+          <p:cNvPr id="4" name="Picture 3"/>
+          <p:cNvPicPr>
+            <a:picLocks noChangeAspect="1"/>
+          </p:cNvPicPr>
+          <p:nvPr/>
+        </p:nvPicPr>
+        <p:blipFill>
+          <a:blip r:embed="rId2"/>
+          <a:stretch>
+            <a:fillRect/>
+          </a:stretch>
+        </p:blipFill>
+        <p:spPr>
+          <a:xfrm>
+            <a:off x="1052548" y="1509504"/>
+            <a:ext cx="6990282" cy="4890891"/>
+          </a:xfrm>
+          <a:prstGeom prst="rect">
+            <a:avLst/>
+          </a:prstGeom>
+        </p:spPr>
+      </p:pic>
+    </p:spTree>
+    <p:extLst>
+      <p:ext uri="{BB962C8B-B14F-4D97-AF65-F5344CB8AC3E}">
+        <p14:creationId xmlns:p14="http://schemas.microsoft.com/office/powerpoint/2010/main" val="3592584481"/>
+      </p:ext>
+    </p:extLst>
+  </p:cSld>
+  <p:clrMapOvr>
+    <a:masterClrMapping/>
+  </p:clrMapOvr>
+</p:sld>
+</file>
+
+<file path=ppt/slides/slide16.xml><?xml version="1.0" encoding="utf-8"?>
+<p:sld xmlns:a="http://schemas.openxmlformats.org/drawingml/2006/main" xmlns:r="http://schemas.openxmlformats.org/officeDocument/2006/relationships" xmlns:p="http://schemas.openxmlformats.org/presentationml/2006/main">
+  <p:cSld>
+    <p:spTree>
+      <p:nvGrpSpPr>
+        <p:cNvPr id="1" name=""/>
+        <p:cNvGrpSpPr/>
+        <p:nvPr/>
+      </p:nvGrpSpPr>
+      <p:grpSpPr>
+        <a:xfrm>
+          <a:off x="0" y="0"/>
+          <a:ext cx="0" cy="0"/>
+          <a:chOff x="0" y="0"/>
+          <a:chExt cx="0" cy="0"/>
+        </a:xfrm>
+      </p:grpSpPr>
+      <p:sp>
+        <p:nvSpPr>
+          <p:cNvPr id="2" name="Title 1"/>
+          <p:cNvSpPr>
+            <a:spLocks noGrp="1"/>
+          </p:cNvSpPr>
+          <p:nvPr>
+            <p:ph type="title"/>
+          </p:nvPr>
+        </p:nvSpPr>
+        <p:spPr/>
+        <p:txBody>
           <a:bodyPr>
             <a:normAutofit/>
           </a:bodyPr>
@@ -4006,268 +4207,6 @@
 </p:sld>
 </file>
 
-<file path=ppt/slides/slide15.xml><?xml version="1.0" encoding="utf-8"?>
-<p:sld xmlns:a="http://schemas.openxmlformats.org/drawingml/2006/main" xmlns:r="http://schemas.openxmlformats.org/officeDocument/2006/relationships" xmlns:p="http://schemas.openxmlformats.org/presentationml/2006/main">
-  <p:cSld>
-    <p:spTree>
-      <p:nvGrpSpPr>
-        <p:cNvPr id="1" name=""/>
-        <p:cNvGrpSpPr/>
-        <p:nvPr/>
-      </p:nvGrpSpPr>
-      <p:grpSpPr>
-        <a:xfrm>
-          <a:off x="0" y="0"/>
-          <a:ext cx="0" cy="0"/>
-          <a:chOff x="0" y="0"/>
-          <a:chExt cx="0" cy="0"/>
-        </a:xfrm>
-      </p:grpSpPr>
-      <p:sp>
-        <p:nvSpPr>
-          <p:cNvPr id="2" name="Title 1"/>
-          <p:cNvSpPr>
-            <a:spLocks noGrp="1"/>
-          </p:cNvSpPr>
-          <p:nvPr>
-            <p:ph type="title"/>
-          </p:nvPr>
-        </p:nvSpPr>
-        <p:spPr/>
-        <p:txBody>
-          <a:bodyPr>
-            <a:normAutofit/>
-          </a:bodyPr>
-          <a:lstStyle/>
-          <a:p>
-            <a:r>
-              <a:rPr lang="en-US" dirty="0" smtClean="0"/>
-              <a:t>CAP Principle</a:t>
-            </a:r>
-            <a:endParaRPr lang="en-US" dirty="0"/>
-          </a:p>
-        </p:txBody>
-      </p:sp>
-      <p:sp>
-        <p:nvSpPr>
-          <p:cNvPr id="3" name="Content Placeholder 2"/>
-          <p:cNvSpPr>
-            <a:spLocks noGrp="1"/>
-          </p:cNvSpPr>
-          <p:nvPr>
-            <p:ph idx="1"/>
-          </p:nvPr>
-        </p:nvSpPr>
-        <p:spPr>
-          <a:xfrm>
-            <a:off x="457200" y="1600200"/>
-            <a:ext cx="8229600" cy="4920629"/>
-          </a:xfrm>
-        </p:spPr>
-        <p:txBody>
-          <a:bodyPr>
-            <a:normAutofit fontScale="92500"/>
-          </a:bodyPr>
-          <a:lstStyle/>
-          <a:p>
-            <a:r>
-              <a:rPr lang="en-US" dirty="0" smtClean="0"/>
-              <a:t>Consistency</a:t>
-            </a:r>
-          </a:p>
-          <a:p>
-            <a:pPr lvl="1"/>
-            <a:r>
-              <a:rPr lang="en-US" dirty="0" smtClean="0"/>
-              <a:t>All nodes see the same data at the same time</a:t>
-            </a:r>
-          </a:p>
-          <a:p>
-            <a:pPr lvl="1"/>
-            <a:r>
-              <a:rPr lang="en-US" dirty="0" smtClean="0"/>
-              <a:t>Options:</a:t>
-            </a:r>
-          </a:p>
-          <a:p>
-            <a:pPr lvl="2"/>
-            <a:r>
-              <a:rPr lang="en-US" dirty="0"/>
-              <a:t>A</a:t>
-            </a:r>
-            <a:r>
-              <a:rPr lang="en-US" dirty="0" smtClean="0"/>
-              <a:t>pplication waits until all server nodes are updated (slow)</a:t>
-            </a:r>
-          </a:p>
-          <a:p>
-            <a:pPr lvl="2"/>
-            <a:r>
-              <a:rPr lang="en-US" dirty="0" smtClean="0"/>
-              <a:t>Application reads data from an available server knowing data might be outdated (fast – eventual consistency)</a:t>
-            </a:r>
-          </a:p>
-          <a:p>
-            <a:pPr lvl="1"/>
-            <a:r>
-              <a:rPr lang="en-US" dirty="0" smtClean="0"/>
-              <a:t>Apps where transactions are significant, like banks, need strong consistency</a:t>
-            </a:r>
-          </a:p>
-          <a:p>
-            <a:pPr lvl="1"/>
-            <a:r>
-              <a:rPr lang="en-US" dirty="0" smtClean="0"/>
-              <a:t>Apps where speed is more important than data recency, like social media, leverage eventual consistency</a:t>
-            </a:r>
-          </a:p>
-          <a:p>
-            <a:pPr lvl="2"/>
-            <a:endParaRPr lang="en-US" dirty="0"/>
-          </a:p>
-          <a:p>
-            <a:pPr marL="457200" lvl="1" indent="0">
-              <a:buNone/>
-            </a:pPr>
-            <a:endParaRPr lang="en-US" dirty="0" smtClean="0"/>
-          </a:p>
-        </p:txBody>
-      </p:sp>
-    </p:spTree>
-    <p:extLst>
-      <p:ext uri="{BB962C8B-B14F-4D97-AF65-F5344CB8AC3E}">
-        <p14:creationId xmlns:p14="http://schemas.microsoft.com/office/powerpoint/2010/main" val="1430246649"/>
-      </p:ext>
-    </p:extLst>
-  </p:cSld>
-  <p:clrMapOvr>
-    <a:masterClrMapping/>
-  </p:clrMapOvr>
-</p:sld>
-</file>
-
-<file path=ppt/slides/slide16.xml><?xml version="1.0" encoding="utf-8"?>
-<p:sld xmlns:a="http://schemas.openxmlformats.org/drawingml/2006/main" xmlns:r="http://schemas.openxmlformats.org/officeDocument/2006/relationships" xmlns:p="http://schemas.openxmlformats.org/presentationml/2006/main">
-  <p:cSld>
-    <p:spTree>
-      <p:nvGrpSpPr>
-        <p:cNvPr id="1" name=""/>
-        <p:cNvGrpSpPr/>
-        <p:nvPr/>
-      </p:nvGrpSpPr>
-      <p:grpSpPr>
-        <a:xfrm>
-          <a:off x="0" y="0"/>
-          <a:ext cx="0" cy="0"/>
-          <a:chOff x="0" y="0"/>
-          <a:chExt cx="0" cy="0"/>
-        </a:xfrm>
-      </p:grpSpPr>
-      <p:sp>
-        <p:nvSpPr>
-          <p:cNvPr id="2" name="Title 1"/>
-          <p:cNvSpPr>
-            <a:spLocks noGrp="1"/>
-          </p:cNvSpPr>
-          <p:nvPr>
-            <p:ph type="title"/>
-          </p:nvPr>
-        </p:nvSpPr>
-        <p:spPr/>
-        <p:txBody>
-          <a:bodyPr>
-            <a:normAutofit/>
-          </a:bodyPr>
-          <a:lstStyle/>
-          <a:p>
-            <a:r>
-              <a:rPr lang="en-US" dirty="0" smtClean="0"/>
-              <a:t>CAP Principle</a:t>
-            </a:r>
-            <a:endParaRPr lang="en-US" dirty="0"/>
-          </a:p>
-        </p:txBody>
-      </p:sp>
-      <p:sp>
-        <p:nvSpPr>
-          <p:cNvPr id="3" name="Content Placeholder 2"/>
-          <p:cNvSpPr>
-            <a:spLocks noGrp="1"/>
-          </p:cNvSpPr>
-          <p:nvPr>
-            <p:ph idx="1"/>
-          </p:nvPr>
-        </p:nvSpPr>
-        <p:spPr>
-          <a:xfrm>
-            <a:off x="457200" y="1600200"/>
-            <a:ext cx="8229600" cy="4920629"/>
-          </a:xfrm>
-        </p:spPr>
-        <p:txBody>
-          <a:bodyPr>
-            <a:normAutofit/>
-          </a:bodyPr>
-          <a:lstStyle/>
-          <a:p>
-            <a:r>
-              <a:rPr lang="en-US" dirty="0" smtClean="0"/>
-              <a:t>Availability</a:t>
-            </a:r>
-          </a:p>
-          <a:p>
-            <a:pPr lvl="1"/>
-            <a:r>
-              <a:rPr lang="en-US" dirty="0" smtClean="0"/>
-              <a:t>Means that the system is accessible when a user makes a request. It’s up!</a:t>
-            </a:r>
-          </a:p>
-          <a:p>
-            <a:pPr lvl="1"/>
-            <a:r>
-              <a:rPr lang="en-US" dirty="0" smtClean="0"/>
-              <a:t>We spread and replicate data on multiple servers to guarantee availability</a:t>
-            </a:r>
-          </a:p>
-          <a:p>
-            <a:pPr lvl="1"/>
-            <a:r>
-              <a:rPr lang="en-US" dirty="0" smtClean="0"/>
-              <a:t>Can an application on a single server be available? Sure, but a single server isn’t a distributed architecture. </a:t>
-            </a:r>
-            <a:r>
-              <a:rPr lang="en-US" dirty="0" smtClean="0">
-                <a:sym typeface="Wingdings"/>
-              </a:rPr>
-              <a:t></a:t>
-            </a:r>
-            <a:r>
-              <a:rPr lang="en-US" dirty="0" smtClean="0"/>
-              <a:t> </a:t>
-            </a:r>
-            <a:endParaRPr lang="en-US" dirty="0"/>
-          </a:p>
-          <a:p>
-            <a:pPr marL="457200" lvl="1" indent="0">
-              <a:buNone/>
-            </a:pPr>
-            <a:endParaRPr lang="en-US" dirty="0" smtClean="0"/>
-          </a:p>
-        </p:txBody>
-      </p:sp>
-    </p:spTree>
-    <p:extLst>
-      <p:ext uri="{BB962C8B-B14F-4D97-AF65-F5344CB8AC3E}">
-        <p14:creationId xmlns:p14="http://schemas.microsoft.com/office/powerpoint/2010/main" val="680282628"/>
-      </p:ext>
-    </p:extLst>
-  </p:cSld>
-  <p:clrMapOvr>
-    <a:masterClrMapping/>
-  </p:clrMapOvr>
-</p:sld>
-</file>
-
 <file path=ppt/slides/slide17.xml><?xml version="1.0" encoding="utf-8"?>
 <p:sld xmlns:a="http://schemas.openxmlformats.org/drawingml/2006/main" xmlns:r="http://schemas.openxmlformats.org/officeDocument/2006/relationships" xmlns:p="http://schemas.openxmlformats.org/presentationml/2006/main">
   <p:cSld>
@@ -4328,35 +4267,63 @@
         </p:spPr>
         <p:txBody>
           <a:bodyPr>
-            <a:normAutofit/>
+            <a:normAutofit fontScale="92500"/>
           </a:bodyPr>
           <a:lstStyle/>
           <a:p>
             <a:r>
               <a:rPr lang="en-US" dirty="0" smtClean="0"/>
-              <a:t>Partition tolerance</a:t>
-            </a:r>
-          </a:p>
-          <a:p>
-            <a:pPr lvl="1"/>
-            <a:r>
-              <a:rPr lang="en-US" dirty="0" smtClean="0"/>
-              <a:t>The system continues to operate despite the failure of part of the system.</a:t>
-            </a:r>
-          </a:p>
-          <a:p>
-            <a:pPr lvl="1"/>
-            <a:r>
-              <a:rPr lang="en-US" dirty="0" smtClean="0"/>
-              <a:t>Classic failure scenario: network link is severed between groups in a pool of servers, creating a partition (split-brain scenario)</a:t>
+              <a:t>Consistency</a:t>
+            </a:r>
+          </a:p>
+          <a:p>
+            <a:pPr lvl="1"/>
+            <a:r>
+              <a:rPr lang="en-US" dirty="0" smtClean="0"/>
+              <a:t>All nodes see the same data at the same time</a:t>
+            </a:r>
+          </a:p>
+          <a:p>
+            <a:pPr lvl="1"/>
+            <a:r>
+              <a:rPr lang="en-US" dirty="0" smtClean="0"/>
+              <a:t>Options:</a:t>
             </a:r>
           </a:p>
           <a:p>
             <a:pPr lvl="2"/>
             <a:r>
-              <a:rPr lang="en-US" dirty="0" smtClean="0"/>
-              <a:t>Can’t maintain consistency because writes to one partition cannot be communicated to other.</a:t>
-            </a:r>
+              <a:rPr lang="en-US" dirty="0"/>
+              <a:t>A</a:t>
+            </a:r>
+            <a:r>
+              <a:rPr lang="en-US" dirty="0" smtClean="0"/>
+              <a:t>pplication waits until all server nodes are updated (slow)</a:t>
+            </a:r>
+          </a:p>
+          <a:p>
+            <a:pPr lvl="2"/>
+            <a:r>
+              <a:rPr lang="en-US" dirty="0" smtClean="0"/>
+              <a:t>Application reads data from an available server knowing data might be outdated (fast – eventual consistency)</a:t>
+            </a:r>
+          </a:p>
+          <a:p>
+            <a:pPr lvl="1"/>
+            <a:r>
+              <a:rPr lang="en-US" dirty="0" smtClean="0"/>
+              <a:t>Apps where transactions are significant, like banks, need strong consistency</a:t>
+            </a:r>
+          </a:p>
+          <a:p>
+            <a:pPr lvl="1"/>
+            <a:r>
+              <a:rPr lang="en-US" dirty="0" smtClean="0"/>
+              <a:t>Apps where speed is more important than data recency, like social media, leverage eventual consistency</a:t>
+            </a:r>
+          </a:p>
+          <a:p>
+            <a:pPr lvl="2"/>
             <a:endParaRPr lang="en-US" dirty="0"/>
           </a:p>
           <a:p>
@@ -4370,7 +4337,7 @@
     </p:spTree>
     <p:extLst>
       <p:ext uri="{BB962C8B-B14F-4D97-AF65-F5344CB8AC3E}">
-        <p14:creationId xmlns:p14="http://schemas.microsoft.com/office/powerpoint/2010/main" val="2891315054"/>
+        <p14:creationId xmlns:p14="http://schemas.microsoft.com/office/powerpoint/2010/main" val="1430246649"/>
       </p:ext>
     </p:extLst>
   </p:cSld>
@@ -4444,60 +4411,41 @@
           </a:bodyPr>
           <a:lstStyle/>
           <a:p>
-            <a:pPr marL="0" indent="0">
-              <a:buNone/>
-            </a:pPr>
-            <a:r>
-              <a:rPr lang="en-US" dirty="0" smtClean="0"/>
-              <a:t>Q: Why is understanding CAP important? </a:t>
-            </a:r>
-          </a:p>
-          <a:p>
-            <a:pPr marL="0" indent="0">
-              <a:buNone/>
-            </a:pPr>
-            <a:r>
-              <a:rPr lang="en-US" dirty="0" smtClean="0"/>
-              <a:t>A: Because it informs our design decisions when building highly distributed systems</a:t>
-            </a:r>
-          </a:p>
-          <a:p>
-            <a:pPr marL="0" indent="0">
-              <a:buNone/>
-            </a:pPr>
-            <a:endParaRPr lang="en-US" dirty="0"/>
-          </a:p>
-          <a:p>
-            <a:pPr lvl="1"/>
-            <a:r>
-              <a:rPr lang="en-US" dirty="0" smtClean="0"/>
-              <a:t>Consistency &amp; Availability (Traditional RDMS)</a:t>
-            </a:r>
-          </a:p>
-          <a:p>
-            <a:pPr lvl="1"/>
-            <a:r>
-              <a:rPr lang="en-US" dirty="0" smtClean="0"/>
-              <a:t>Consistency &amp; Partition Tolerance (</a:t>
-            </a:r>
-            <a:r>
-              <a:rPr lang="en-US" dirty="0" err="1" smtClean="0"/>
-              <a:t>MongoDB</a:t>
-            </a:r>
-            <a:r>
-              <a:rPr lang="en-US" dirty="0" smtClean="0"/>
-              <a:t>)</a:t>
-            </a:r>
-          </a:p>
-          <a:p>
-            <a:pPr lvl="1"/>
-            <a:r>
-              <a:rPr lang="en-US" dirty="0" smtClean="0"/>
-              <a:t>Availability &amp; Partition Tolerance (Dynamo)</a:t>
-            </a:r>
-          </a:p>
-          <a:p>
-            <a:pPr lvl="1"/>
+            <a:r>
+              <a:rPr lang="en-US" dirty="0" smtClean="0"/>
+              <a:t>Availability</a:t>
+            </a:r>
+          </a:p>
+          <a:p>
+            <a:pPr lvl="1"/>
+            <a:r>
+              <a:rPr lang="en-US" dirty="0" smtClean="0"/>
+              <a:t>Means that the system is accessible when a user makes a request. It’s up!</a:t>
+            </a:r>
+          </a:p>
+          <a:p>
+            <a:pPr lvl="1"/>
+            <a:r>
+              <a:rPr lang="en-US" dirty="0" smtClean="0"/>
+              <a:t>We spread and replicate data on multiple servers to guarantee availability</a:t>
+            </a:r>
+          </a:p>
+          <a:p>
+            <a:pPr lvl="1"/>
+            <a:r>
+              <a:rPr lang="en-US" dirty="0" smtClean="0"/>
+              <a:t>Can an application on a single server be available? Sure, but a single server isn’t a distributed architecture. </a:t>
+            </a:r>
+            <a:r>
+              <a:rPr lang="en-US" dirty="0" smtClean="0">
+                <a:sym typeface="Wingdings"/>
+              </a:rPr>
+              <a:t></a:t>
+            </a:r>
+            <a:r>
+              <a:rPr lang="en-US" dirty="0" smtClean="0"/>
+              <a:t> </a:t>
+            </a:r>
             <a:endParaRPr lang="en-US" dirty="0"/>
           </a:p>
           <a:p>
@@ -4511,7 +4459,7 @@
     </p:spTree>
     <p:extLst>
       <p:ext uri="{BB962C8B-B14F-4D97-AF65-F5344CB8AC3E}">
-        <p14:creationId xmlns:p14="http://schemas.microsoft.com/office/powerpoint/2010/main" val="2830511430"/>
+        <p14:creationId xmlns:p14="http://schemas.microsoft.com/office/powerpoint/2010/main" val="680282628"/>
       </p:ext>
     </p:extLst>
   </p:cSld>
@@ -4556,8 +4504,8 @@
           <a:lstStyle/>
           <a:p>
             <a:r>
-              <a:rPr lang="en-US" dirty="0" err="1" smtClean="0"/>
-              <a:t>NoSQL</a:t>
+              <a:rPr lang="en-US" dirty="0" smtClean="0"/>
+              <a:t>CAP Principle</a:t>
             </a:r>
             <a:endParaRPr lang="en-US" dirty="0"/>
           </a:p>
@@ -4581,83 +4529,34 @@
         </p:spPr>
         <p:txBody>
           <a:bodyPr>
-            <a:normAutofit fontScale="92500" lnSpcReduction="20000"/>
+            <a:normAutofit/>
           </a:bodyPr>
           <a:lstStyle/>
           <a:p>
             <a:r>
               <a:rPr lang="en-US" dirty="0" smtClean="0"/>
-              <a:t>Growth of </a:t>
-            </a:r>
-            <a:r>
-              <a:rPr lang="en-US" dirty="0" err="1" smtClean="0"/>
-              <a:t>NoSQL</a:t>
-            </a:r>
-            <a:r>
-              <a:rPr lang="en-US" dirty="0" smtClean="0"/>
-              <a:t> correlated to the growth of distributed systems</a:t>
-            </a:r>
-          </a:p>
-          <a:p>
-            <a:r>
-              <a:rPr lang="en-US" dirty="0" smtClean="0"/>
-              <a:t>Store data closer to the way it’s actually represented</a:t>
-            </a:r>
-          </a:p>
-          <a:p>
-            <a:r>
-              <a:rPr lang="en-US" dirty="0" err="1" smtClean="0"/>
-              <a:t>NoSQL</a:t>
-            </a:r>
-            <a:r>
-              <a:rPr lang="en-US" dirty="0"/>
-              <a:t> </a:t>
-            </a:r>
-            <a:r>
-              <a:rPr lang="en-US" dirty="0" smtClean="0"/>
-              <a:t>= Not only SQL</a:t>
-            </a:r>
-          </a:p>
-          <a:p>
-            <a:r>
-              <a:rPr lang="en-US" dirty="0" smtClean="0"/>
-              <a:t>Several different types of </a:t>
-            </a:r>
-            <a:r>
-              <a:rPr lang="en-US" dirty="0" err="1" smtClean="0"/>
-              <a:t>NoSQL</a:t>
-            </a:r>
-            <a:r>
-              <a:rPr lang="en-US" dirty="0" smtClean="0"/>
-              <a:t> database, each solving different scaling issues</a:t>
-            </a:r>
-          </a:p>
-          <a:p>
-            <a:r>
-              <a:rPr lang="en-US" dirty="0" smtClean="0"/>
-              <a:t>Big data is a major scaling issue</a:t>
-            </a:r>
-          </a:p>
-          <a:p>
-            <a:pPr lvl="1"/>
-            <a:r>
-              <a:rPr lang="en-US" dirty="0" err="1" smtClean="0"/>
-              <a:t>NoSQL</a:t>
-            </a:r>
-            <a:r>
-              <a:rPr lang="en-US" dirty="0" smtClean="0"/>
-              <a:t> approach is to shard the data</a:t>
-            </a:r>
-          </a:p>
-          <a:p>
-            <a:pPr lvl="1"/>
-            <a:r>
-              <a:rPr lang="en-US" dirty="0" err="1" smtClean="0"/>
-              <a:t>Sharding</a:t>
-            </a:r>
-            <a:r>
-              <a:rPr lang="en-US" dirty="0" smtClean="0"/>
-              <a:t> = partitioning the data across multiple databases</a:t>
+              <a:t>Partition tolerance</a:t>
+            </a:r>
+          </a:p>
+          <a:p>
+            <a:pPr lvl="1"/>
+            <a:r>
+              <a:rPr lang="en-US" dirty="0" smtClean="0"/>
+              <a:t>The system continues to operate despite the failure of part of the system.</a:t>
+            </a:r>
+          </a:p>
+          <a:p>
+            <a:pPr lvl="1"/>
+            <a:r>
+              <a:rPr lang="en-US" dirty="0" smtClean="0"/>
+              <a:t>Classic failure scenario: network link is severed between groups in a pool of servers, creating a partition (split-brain scenario)</a:t>
+            </a:r>
+          </a:p>
+          <a:p>
+            <a:pPr lvl="2"/>
+            <a:r>
+              <a:rPr lang="en-US" dirty="0" smtClean="0"/>
+              <a:t>Can’t maintain consistency because writes to one partition cannot be communicated to other.</a:t>
             </a:r>
             <a:endParaRPr lang="en-US" dirty="0"/>
           </a:p>
@@ -4672,7 +4571,7 @@
     </p:spTree>
     <p:extLst>
       <p:ext uri="{BB962C8B-B14F-4D97-AF65-F5344CB8AC3E}">
-        <p14:creationId xmlns:p14="http://schemas.microsoft.com/office/powerpoint/2010/main" val="1927538517"/>
+        <p14:creationId xmlns:p14="http://schemas.microsoft.com/office/powerpoint/2010/main" val="2891315054"/>
       </p:ext>
     </p:extLst>
   </p:cSld>
@@ -4804,12 +4703,8 @@
           <a:lstStyle/>
           <a:p>
             <a:r>
-              <a:rPr lang="en-US" dirty="0" err="1" smtClean="0"/>
-              <a:t>NoSQL</a:t>
-            </a:r>
-            <a:r>
-              <a:rPr lang="en-US" dirty="0" smtClean="0"/>
-              <a:t> types</a:t>
+              <a:rPr lang="en-US" dirty="0" smtClean="0"/>
+              <a:t>CAP Principle</a:t>
             </a:r>
             <a:endParaRPr lang="en-US" dirty="0"/>
           </a:p>
@@ -4837,81 +4732,61 @@
           </a:bodyPr>
           <a:lstStyle/>
           <a:p>
-            <a:r>
-              <a:rPr lang="en-US" dirty="0" smtClean="0"/>
-              <a:t>Key/value</a:t>
-            </a:r>
-          </a:p>
-          <a:p>
-            <a:pPr lvl="1"/>
-            <a:r>
-              <a:rPr lang="en-US" dirty="0" smtClean="0"/>
-              <a:t>Provide a key/value</a:t>
-            </a:r>
-          </a:p>
-          <a:p>
-            <a:pPr lvl="1"/>
-            <a:r>
-              <a:rPr lang="en-US" dirty="0" smtClean="0"/>
-              <a:t>Query a key and get a value returned</a:t>
-            </a:r>
-          </a:p>
-          <a:p>
-            <a:pPr lvl="1"/>
-            <a:r>
-              <a:rPr lang="en-US" dirty="0" smtClean="0"/>
-              <a:t>Based on hashing algorithm &amp; easy to shard</a:t>
-            </a:r>
-          </a:p>
-          <a:p>
-            <a:pPr lvl="1"/>
-            <a:r>
-              <a:rPr lang="en-US" dirty="0" smtClean="0"/>
-              <a:t>Popular way to store web user sessions</a:t>
-            </a:r>
-          </a:p>
-          <a:p>
-            <a:pPr lvl="2"/>
-            <a:r>
-              <a:rPr lang="en-US" dirty="0" smtClean="0"/>
-              <a:t>Key = </a:t>
+            <a:pPr marL="0" indent="0">
+              <a:buNone/>
+            </a:pPr>
+            <a:r>
+              <a:rPr lang="en-US" dirty="0" smtClean="0"/>
+              <a:t>Q: Why is understanding CAP important? </a:t>
+            </a:r>
+          </a:p>
+          <a:p>
+            <a:pPr marL="0" indent="0">
+              <a:buNone/>
+            </a:pPr>
+            <a:r>
+              <a:rPr lang="en-US" dirty="0" smtClean="0"/>
+              <a:t>A: Because it informs our design decisions when building highly distributed systems</a:t>
+            </a:r>
+          </a:p>
+          <a:p>
+            <a:pPr marL="0" indent="0">
+              <a:buNone/>
+            </a:pPr>
+            <a:endParaRPr lang="en-US" dirty="0"/>
+          </a:p>
+          <a:p>
+            <a:pPr lvl="1"/>
+            <a:r>
+              <a:rPr lang="en-US" dirty="0" smtClean="0"/>
+              <a:t>Consistency &amp; Availability (Traditional RDMS)</a:t>
+            </a:r>
+          </a:p>
+          <a:p>
+            <a:pPr lvl="1"/>
+            <a:r>
+              <a:rPr lang="en-US" dirty="0" smtClean="0"/>
+              <a:t>Consistency &amp; Partition Tolerance (</a:t>
             </a:r>
             <a:r>
               <a:rPr lang="en-US" dirty="0" err="1" smtClean="0"/>
-              <a:t>sessionId</a:t>
-            </a:r>
-            <a:endParaRPr lang="en-US" dirty="0" smtClean="0"/>
-          </a:p>
-          <a:p>
-            <a:pPr lvl="2"/>
-            <a:r>
-              <a:rPr lang="en-US" dirty="0" smtClean="0"/>
-              <a:t>Value = serialized session object</a:t>
-            </a:r>
-          </a:p>
-          <a:p>
-            <a:pPr lvl="1"/>
-            <a:r>
-              <a:rPr lang="en-US" dirty="0" smtClean="0"/>
-              <a:t>Examples: </a:t>
-            </a:r>
-            <a:r>
-              <a:rPr lang="en-US" dirty="0" err="1" smtClean="0"/>
-              <a:t>Redis</a:t>
-            </a:r>
-            <a:r>
-              <a:rPr lang="en-US" dirty="0" smtClean="0"/>
-              <a:t>, </a:t>
-            </a:r>
-            <a:r>
-              <a:rPr lang="en-US" dirty="0" err="1" smtClean="0"/>
-              <a:t>memcached</a:t>
-            </a:r>
-            <a:endParaRPr lang="en-US" dirty="0"/>
-          </a:p>
-          <a:p>
-            <a:pPr lvl="1"/>
-            <a:endParaRPr lang="en-US" dirty="0" smtClean="0"/>
+              <a:t>MongoDB</a:t>
+            </a:r>
+            <a:r>
+              <a:rPr lang="en-US" dirty="0" smtClean="0"/>
+              <a:t>)</a:t>
+            </a:r>
+          </a:p>
+          <a:p>
+            <a:pPr lvl="1"/>
+            <a:r>
+              <a:rPr lang="en-US" dirty="0" smtClean="0"/>
+              <a:t>Availability &amp; Partition Tolerance (Dynamo)</a:t>
+            </a:r>
+          </a:p>
+          <a:p>
+            <a:pPr lvl="1"/>
+            <a:endParaRPr lang="en-US" dirty="0"/>
           </a:p>
           <a:p>
             <a:pPr marL="457200" lvl="1" indent="0">
@@ -4924,7 +4799,7 @@
     </p:spTree>
     <p:extLst>
       <p:ext uri="{BB962C8B-B14F-4D97-AF65-F5344CB8AC3E}">
-        <p14:creationId xmlns:p14="http://schemas.microsoft.com/office/powerpoint/2010/main" val="1948312763"/>
+        <p14:creationId xmlns:p14="http://schemas.microsoft.com/office/powerpoint/2010/main" val="2830511430"/>
       </p:ext>
     </p:extLst>
   </p:cSld>
@@ -4972,10 +4847,6 @@
               <a:rPr lang="en-US" dirty="0" err="1" smtClean="0"/>
               <a:t>NoSQL</a:t>
             </a:r>
-            <a:r>
-              <a:rPr lang="en-US" dirty="0" smtClean="0"/>
-              <a:t> types</a:t>
-            </a:r>
             <a:endParaRPr lang="en-US" dirty="0"/>
           </a:p>
         </p:txBody>
@@ -4998,58 +4869,85 @@
         </p:spPr>
         <p:txBody>
           <a:bodyPr>
-            <a:normAutofit/>
+            <a:normAutofit fontScale="92500" lnSpcReduction="20000"/>
           </a:bodyPr>
           <a:lstStyle/>
           <a:p>
             <a:r>
               <a:rPr lang="en-US" dirty="0" smtClean="0"/>
-              <a:t>Columnar</a:t>
-            </a:r>
-          </a:p>
-          <a:p>
-            <a:pPr lvl="1"/>
-            <a:r>
-              <a:rPr lang="en-US" dirty="0" smtClean="0"/>
-              <a:t>Imaging pivoting a traditional database table</a:t>
-            </a:r>
-          </a:p>
-          <a:p>
-            <a:pPr lvl="1"/>
-            <a:r>
-              <a:rPr lang="en-US" dirty="0" smtClean="0"/>
-              <a:t>Store columns instead of storing columns in sequential disk pages</a:t>
-            </a:r>
-          </a:p>
-          <a:p>
-            <a:pPr lvl="1"/>
-            <a:r>
-              <a:rPr lang="en-US" dirty="0" smtClean="0"/>
-              <a:t>Super-fast tabulation-type operations (</a:t>
+              <a:t>Growth of </a:t>
             </a:r>
             <a:r>
               <a:rPr lang="en-US" dirty="0" err="1" smtClean="0"/>
-              <a:t>whats</a:t>
-            </a:r>
-            <a:r>
-              <a:rPr lang="en-US" dirty="0" smtClean="0"/>
-              <a:t> the total profit across all products in the company)</a:t>
-            </a:r>
-          </a:p>
-          <a:p>
-            <a:pPr lvl="1"/>
-            <a:r>
-              <a:rPr lang="en-US" dirty="0" smtClean="0"/>
-              <a:t>Examples: </a:t>
-            </a:r>
+              <a:t>NoSQL</a:t>
+            </a:r>
+            <a:r>
+              <a:rPr lang="en-US" dirty="0" smtClean="0"/>
+              <a:t> correlated to the growth of distributed systems</a:t>
+            </a:r>
+          </a:p>
+          <a:p>
+            <a:r>
+              <a:rPr lang="en-US" dirty="0" smtClean="0"/>
+              <a:t>Store data closer to the way it’s actually represented</a:t>
+            </a:r>
+          </a:p>
+          <a:p>
             <a:r>
               <a:rPr lang="en-US" dirty="0" err="1" smtClean="0"/>
-              <a:t>Hbase</a:t>
-            </a:r>
-            <a:r>
-              <a:rPr lang="en-US" dirty="0" smtClean="0"/>
-              <a:t>, Redshift</a:t>
-            </a:r>
+              <a:t>NoSQL</a:t>
+            </a:r>
+            <a:r>
+              <a:rPr lang="en-US" dirty="0"/>
+              <a:t> </a:t>
+            </a:r>
+            <a:r>
+              <a:rPr lang="en-US" dirty="0" smtClean="0"/>
+              <a:t>= Not only SQL</a:t>
+            </a:r>
+          </a:p>
+          <a:p>
+            <a:r>
+              <a:rPr lang="en-US" dirty="0" smtClean="0"/>
+              <a:t>Several different types of </a:t>
+            </a:r>
+            <a:r>
+              <a:rPr lang="en-US" dirty="0" err="1" smtClean="0"/>
+              <a:t>NoSQL</a:t>
+            </a:r>
+            <a:r>
+              <a:rPr lang="en-US" dirty="0" smtClean="0"/>
+              <a:t> database, each solving different scaling issues</a:t>
+            </a:r>
+          </a:p>
+          <a:p>
+            <a:r>
+              <a:rPr lang="en-US" dirty="0" smtClean="0"/>
+              <a:t>Big data is a major scaling issue</a:t>
+            </a:r>
+          </a:p>
+          <a:p>
+            <a:pPr lvl="1"/>
+            <a:r>
+              <a:rPr lang="en-US" dirty="0" err="1" smtClean="0"/>
+              <a:t>NoSQL</a:t>
+            </a:r>
+            <a:r>
+              <a:rPr lang="en-US" dirty="0" smtClean="0"/>
+              <a:t> approach is to shard the data</a:t>
+            </a:r>
+          </a:p>
+          <a:p>
+            <a:pPr lvl="1"/>
+            <a:r>
+              <a:rPr lang="en-US" dirty="0" err="1" smtClean="0"/>
+              <a:t>Sharding</a:t>
+            </a:r>
+            <a:r>
+              <a:rPr lang="en-US" dirty="0" smtClean="0"/>
+              <a:t> = partitioning the data across multiple databases</a:t>
+            </a:r>
+            <a:endParaRPr lang="en-US" dirty="0"/>
           </a:p>
           <a:p>
             <a:pPr marL="457200" lvl="1" indent="0">
@@ -5062,7 +4960,7 @@
     </p:spTree>
     <p:extLst>
       <p:ext uri="{BB962C8B-B14F-4D97-AF65-F5344CB8AC3E}">
-        <p14:creationId xmlns:p14="http://schemas.microsoft.com/office/powerpoint/2010/main" val="617873407"/>
+        <p14:creationId xmlns:p14="http://schemas.microsoft.com/office/powerpoint/2010/main" val="1927538517"/>
       </p:ext>
     </p:extLst>
   </p:cSld>
@@ -5142,43 +5040,54 @@
           <a:p>
             <a:r>
               <a:rPr lang="en-US" dirty="0" smtClean="0"/>
-              <a:t>Document</a:t>
-            </a:r>
-          </a:p>
-          <a:p>
-            <a:pPr lvl="1"/>
-            <a:r>
-              <a:rPr lang="en-US" dirty="0" smtClean="0"/>
-              <a:t>Store documents instead of individual atomic records</a:t>
-            </a:r>
-          </a:p>
-          <a:p>
-            <a:pPr lvl="1"/>
-            <a:r>
-              <a:rPr lang="en-US" dirty="0" smtClean="0"/>
-              <a:t>Each document is stored in the form of </a:t>
+              <a:t>Key/value</a:t>
+            </a:r>
+          </a:p>
+          <a:p>
+            <a:pPr lvl="1"/>
+            <a:r>
+              <a:rPr lang="en-US" dirty="0" smtClean="0"/>
+              <a:t>Provide a key/value</a:t>
+            </a:r>
+          </a:p>
+          <a:p>
+            <a:pPr lvl="1"/>
+            <a:r>
+              <a:rPr lang="en-US" dirty="0" smtClean="0"/>
+              <a:t>Query a key and get a value returned</a:t>
+            </a:r>
+          </a:p>
+          <a:p>
+            <a:pPr lvl="1"/>
+            <a:r>
+              <a:rPr lang="en-US" dirty="0" smtClean="0"/>
+              <a:t>Based on hashing algorithm &amp; easy to shard</a:t>
+            </a:r>
+          </a:p>
+          <a:p>
+            <a:pPr lvl="1"/>
+            <a:r>
+              <a:rPr lang="en-US" dirty="0" smtClean="0"/>
+              <a:t>Popular way to store web user sessions</a:t>
+            </a:r>
+          </a:p>
+          <a:p>
+            <a:pPr lvl="2"/>
+            <a:r>
+              <a:rPr lang="en-US" dirty="0" smtClean="0"/>
+              <a:t>Key = </a:t>
             </a:r>
             <a:r>
               <a:rPr lang="en-US" dirty="0" err="1" smtClean="0"/>
-              <a:t>Javascript</a:t>
-            </a:r>
-            <a:r>
-              <a:rPr lang="en-US" dirty="0" smtClean="0"/>
-              <a:t> Object Notation (JSON)</a:t>
-            </a:r>
-          </a:p>
-          <a:p>
-            <a:pPr lvl="1"/>
-            <a:r>
-              <a:rPr lang="en-US" dirty="0" smtClean="0"/>
-              <a:t>Supports hierarchical and embedded data structures</a:t>
-            </a:r>
+              <a:t>sessionId</a:t>
+            </a:r>
+            <a:endParaRPr lang="en-US" dirty="0" smtClean="0"/>
           </a:p>
           <a:p>
             <a:pPr lvl="2"/>
             <a:r>
               <a:rPr lang="en-US" dirty="0" smtClean="0"/>
-              <a:t>A person can have many addresses, each address is embedded in the document</a:t>
+              <a:t>Value = serialized session object</a:t>
             </a:r>
           </a:p>
           <a:p>
@@ -5189,7 +5098,7 @@
             </a:r>
             <a:r>
               <a:rPr lang="en-US" dirty="0" err="1" smtClean="0"/>
-              <a:t>MongoDB</a:t>
+              <a:t>Redis</a:t>
             </a:r>
             <a:r>
               <a:rPr lang="en-US" dirty="0" smtClean="0"/>
@@ -5197,8 +5106,12 @@
             </a:r>
             <a:r>
               <a:rPr lang="en-US" dirty="0" err="1" smtClean="0"/>
-              <a:t>DynamoDB</a:t>
-            </a:r>
+              <a:t>memcached</a:t>
+            </a:r>
+            <a:endParaRPr lang="en-US" dirty="0"/>
+          </a:p>
+          <a:p>
+            <a:pPr lvl="1"/>
             <a:endParaRPr lang="en-US" dirty="0" smtClean="0"/>
           </a:p>
           <a:p>
@@ -5212,7 +5125,7 @@
     </p:spTree>
     <p:extLst>
       <p:ext uri="{BB962C8B-B14F-4D97-AF65-F5344CB8AC3E}">
-        <p14:creationId xmlns:p14="http://schemas.microsoft.com/office/powerpoint/2010/main" val="3038125591"/>
+        <p14:creationId xmlns:p14="http://schemas.microsoft.com/office/powerpoint/2010/main" val="1948312763"/>
       </p:ext>
     </p:extLst>
   </p:cSld>
@@ -5292,46 +5205,51 @@
           <a:p>
             <a:r>
               <a:rPr lang="en-US" dirty="0" smtClean="0"/>
-              <a:t>Graph</a:t>
-            </a:r>
-          </a:p>
-          <a:p>
-            <a:pPr lvl="1"/>
-            <a:r>
-              <a:rPr lang="en-US" dirty="0" smtClean="0"/>
-              <a:t>Stores data in nodes and edges of a graph</a:t>
-            </a:r>
-          </a:p>
-          <a:p>
-            <a:pPr lvl="1"/>
-            <a:r>
-              <a:rPr lang="en-US" dirty="0" smtClean="0"/>
-              <a:t>Able to easily store and maintain complex relationships (social media)</a:t>
-            </a:r>
-          </a:p>
-          <a:p>
-            <a:pPr lvl="1"/>
-            <a:r>
-              <a:rPr lang="en-US" dirty="0" smtClean="0"/>
-              <a:t>Example Neo4j</a:t>
-            </a:r>
-          </a:p>
-          <a:p>
-            <a:pPr lvl="1"/>
-            <a:endParaRPr lang="en-US" dirty="0"/>
-          </a:p>
-          <a:p>
-            <a:r>
-              <a:rPr lang="en-US" dirty="0" smtClean="0"/>
-              <a:t>If you are interested in </a:t>
+              <a:t>Columnar</a:t>
+            </a:r>
+          </a:p>
+          <a:p>
+            <a:pPr lvl="1"/>
+            <a:r>
+              <a:rPr lang="en-US" dirty="0" smtClean="0"/>
+              <a:t>Imaging pivoting a traditional database table</a:t>
+            </a:r>
+          </a:p>
+          <a:p>
+            <a:pPr lvl="1"/>
+            <a:r>
+              <a:rPr lang="en-US" dirty="0" smtClean="0"/>
+              <a:t>Store columns instead of storing columns in sequential disk pages</a:t>
+            </a:r>
+          </a:p>
+          <a:p>
+            <a:pPr lvl="1"/>
+            <a:r>
+              <a:rPr lang="en-US" dirty="0" smtClean="0"/>
+              <a:t>Super-fast tabulation-type operations (</a:t>
             </a:r>
             <a:r>
               <a:rPr lang="en-US" dirty="0" err="1" smtClean="0"/>
-              <a:t>NoSQL</a:t>
-            </a:r>
-            <a:r>
-              <a:rPr lang="en-US" dirty="0" smtClean="0"/>
-              <a:t>, take the Big Data Management course</a:t>
+              <a:t>whats</a:t>
+            </a:r>
+            <a:r>
+              <a:rPr lang="en-US" dirty="0" smtClean="0"/>
+              <a:t> the total profit across all products in the company)</a:t>
+            </a:r>
+          </a:p>
+          <a:p>
+            <a:pPr lvl="1"/>
+            <a:r>
+              <a:rPr lang="en-US" dirty="0" smtClean="0"/>
+              <a:t>Examples: </a:t>
+            </a:r>
+            <a:r>
+              <a:rPr lang="en-US" dirty="0" err="1" smtClean="0"/>
+              <a:t>Hbase</a:t>
+            </a:r>
+            <a:r>
+              <a:rPr lang="en-US" dirty="0" smtClean="0"/>
+              <a:t>, Redshift</a:t>
             </a:r>
           </a:p>
           <a:p>
@@ -5345,7 +5263,7 @@
     </p:spTree>
     <p:extLst>
       <p:ext uri="{BB962C8B-B14F-4D97-AF65-F5344CB8AC3E}">
-        <p14:creationId xmlns:p14="http://schemas.microsoft.com/office/powerpoint/2010/main" val="545553094"/>
+        <p14:creationId xmlns:p14="http://schemas.microsoft.com/office/powerpoint/2010/main" val="617873407"/>
       </p:ext>
     </p:extLst>
   </p:cSld>
@@ -5390,8 +5308,12 @@
           <a:lstStyle/>
           <a:p>
             <a:r>
-              <a:rPr lang="en-US" dirty="0" smtClean="0"/>
-              <a:t>Distributed system coupling</a:t>
+              <a:rPr lang="en-US" dirty="0" err="1" smtClean="0"/>
+              <a:t>NoSQL</a:t>
+            </a:r>
+            <a:r>
+              <a:rPr lang="en-US" dirty="0" smtClean="0"/>
+              <a:t> types</a:t>
             </a:r>
             <a:endParaRPr lang="en-US" dirty="0"/>
           </a:p>
@@ -5421,42 +5343,64 @@
           <a:p>
             <a:r>
               <a:rPr lang="en-US" dirty="0" smtClean="0"/>
-              <a:t>You learned about the concept of coupling in the software engineering course </a:t>
-            </a:r>
-          </a:p>
-          <a:p>
-            <a:r>
-              <a:rPr lang="en-US" dirty="0" smtClean="0"/>
-              <a:t>In general, loose coupling is desirable</a:t>
-            </a:r>
-          </a:p>
-          <a:p>
-            <a:pPr lvl="1"/>
-            <a:r>
-              <a:rPr lang="en-US" dirty="0" smtClean="0"/>
-              <a:t>Easier to maintain and replace components</a:t>
-            </a:r>
-          </a:p>
-          <a:p>
-            <a:pPr lvl="1"/>
-            <a:r>
-              <a:rPr lang="en-US" dirty="0" smtClean="0"/>
-              <a:t>Fewer bugs and hidden dependencies</a:t>
-            </a:r>
-          </a:p>
-          <a:p>
-            <a:pPr lvl="1"/>
-            <a:r>
-              <a:rPr lang="en-US" dirty="0" smtClean="0"/>
-              <a:t>More flexible</a:t>
-            </a:r>
-          </a:p>
-          <a:p>
-            <a:r>
-              <a:rPr lang="en-US" dirty="0" smtClean="0"/>
-              <a:t>Loose coupling is highly desirable in distributed systems as well</a:t>
-            </a:r>
-            <a:endParaRPr lang="en-US" dirty="0"/>
+              <a:t>Document</a:t>
+            </a:r>
+          </a:p>
+          <a:p>
+            <a:pPr lvl="1"/>
+            <a:r>
+              <a:rPr lang="en-US" dirty="0" smtClean="0"/>
+              <a:t>Store documents instead of individual atomic records</a:t>
+            </a:r>
+          </a:p>
+          <a:p>
+            <a:pPr lvl="1"/>
+            <a:r>
+              <a:rPr lang="en-US" dirty="0" smtClean="0"/>
+              <a:t>Each document is stored in the form of </a:t>
+            </a:r>
+            <a:r>
+              <a:rPr lang="en-US" dirty="0" err="1" smtClean="0"/>
+              <a:t>Javascript</a:t>
+            </a:r>
+            <a:r>
+              <a:rPr lang="en-US" dirty="0" smtClean="0"/>
+              <a:t> Object Notation (JSON)</a:t>
+            </a:r>
+          </a:p>
+          <a:p>
+            <a:pPr lvl="1"/>
+            <a:r>
+              <a:rPr lang="en-US" dirty="0" smtClean="0"/>
+              <a:t>Supports hierarchical and embedded data structures</a:t>
+            </a:r>
+          </a:p>
+          <a:p>
+            <a:pPr lvl="2"/>
+            <a:r>
+              <a:rPr lang="en-US" dirty="0" smtClean="0"/>
+              <a:t>A person can have many addresses, each address is embedded in the document</a:t>
+            </a:r>
+          </a:p>
+          <a:p>
+            <a:pPr lvl="1"/>
+            <a:r>
+              <a:rPr lang="en-US" dirty="0" smtClean="0"/>
+              <a:t>Examples: </a:t>
+            </a:r>
+            <a:r>
+              <a:rPr lang="en-US" dirty="0" err="1" smtClean="0"/>
+              <a:t>MongoDB</a:t>
+            </a:r>
+            <a:r>
+              <a:rPr lang="en-US" dirty="0" smtClean="0"/>
+              <a:t>, </a:t>
+            </a:r>
+            <a:r>
+              <a:rPr lang="en-US" dirty="0" err="1" smtClean="0"/>
+              <a:t>DynamoDB</a:t>
+            </a:r>
+            <a:endParaRPr lang="en-US" dirty="0" smtClean="0"/>
           </a:p>
           <a:p>
             <a:pPr marL="457200" lvl="1" indent="0">
@@ -5469,7 +5413,7 @@
     </p:spTree>
     <p:extLst>
       <p:ext uri="{BB962C8B-B14F-4D97-AF65-F5344CB8AC3E}">
-        <p14:creationId xmlns:p14="http://schemas.microsoft.com/office/powerpoint/2010/main" val="3666338030"/>
+        <p14:creationId xmlns:p14="http://schemas.microsoft.com/office/powerpoint/2010/main" val="3038125591"/>
       </p:ext>
     </p:extLst>
   </p:cSld>
@@ -5509,13 +5453,17 @@
         <p:spPr/>
         <p:txBody>
           <a:bodyPr>
-            <a:normAutofit fontScale="90000"/>
+            <a:normAutofit/>
           </a:bodyPr>
           <a:lstStyle/>
           <a:p>
             <a:r>
-              <a:rPr lang="en-US" dirty="0" smtClean="0"/>
-              <a:t>Scaling performance of distributed systems</a:t>
+              <a:rPr lang="en-US" dirty="0" err="1" smtClean="0"/>
+              <a:t>NoSQL</a:t>
+            </a:r>
+            <a:r>
+              <a:rPr lang="en-US" dirty="0" smtClean="0"/>
+              <a:t> types</a:t>
             </a:r>
             <a:endParaRPr lang="en-US" dirty="0"/>
           </a:p>
@@ -5545,6 +5493,259 @@
           <a:p>
             <a:r>
               <a:rPr lang="en-US" dirty="0" smtClean="0"/>
+              <a:t>Graph</a:t>
+            </a:r>
+          </a:p>
+          <a:p>
+            <a:pPr lvl="1"/>
+            <a:r>
+              <a:rPr lang="en-US" dirty="0" smtClean="0"/>
+              <a:t>Stores data in nodes and edges of a graph</a:t>
+            </a:r>
+          </a:p>
+          <a:p>
+            <a:pPr lvl="1"/>
+            <a:r>
+              <a:rPr lang="en-US" dirty="0" smtClean="0"/>
+              <a:t>Able to easily store and maintain complex relationships (social media)</a:t>
+            </a:r>
+          </a:p>
+          <a:p>
+            <a:pPr lvl="1"/>
+            <a:r>
+              <a:rPr lang="en-US" dirty="0" smtClean="0"/>
+              <a:t>Example Neo4j</a:t>
+            </a:r>
+          </a:p>
+          <a:p>
+            <a:pPr lvl="1"/>
+            <a:endParaRPr lang="en-US" dirty="0"/>
+          </a:p>
+          <a:p>
+            <a:r>
+              <a:rPr lang="en-US" dirty="0" smtClean="0"/>
+              <a:t>If you are interested in </a:t>
+            </a:r>
+            <a:r>
+              <a:rPr lang="en-US" dirty="0" err="1" smtClean="0"/>
+              <a:t>NoSQL</a:t>
+            </a:r>
+            <a:r>
+              <a:rPr lang="en-US" dirty="0" smtClean="0"/>
+              <a:t>, take the Big Data Management course</a:t>
+            </a:r>
+          </a:p>
+          <a:p>
+            <a:pPr marL="457200" lvl="1" indent="0">
+              <a:buNone/>
+            </a:pPr>
+            <a:endParaRPr lang="en-US" dirty="0" smtClean="0"/>
+          </a:p>
+        </p:txBody>
+      </p:sp>
+    </p:spTree>
+    <p:extLst>
+      <p:ext uri="{BB962C8B-B14F-4D97-AF65-F5344CB8AC3E}">
+        <p14:creationId xmlns:p14="http://schemas.microsoft.com/office/powerpoint/2010/main" val="545553094"/>
+      </p:ext>
+    </p:extLst>
+  </p:cSld>
+  <p:clrMapOvr>
+    <a:masterClrMapping/>
+  </p:clrMapOvr>
+</p:sld>
+</file>
+
+<file path=ppt/slides/slide26.xml><?xml version="1.0" encoding="utf-8"?>
+<p:sld xmlns:a="http://schemas.openxmlformats.org/drawingml/2006/main" xmlns:r="http://schemas.openxmlformats.org/officeDocument/2006/relationships" xmlns:p="http://schemas.openxmlformats.org/presentationml/2006/main">
+  <p:cSld>
+    <p:spTree>
+      <p:nvGrpSpPr>
+        <p:cNvPr id="1" name=""/>
+        <p:cNvGrpSpPr/>
+        <p:nvPr/>
+      </p:nvGrpSpPr>
+      <p:grpSpPr>
+        <a:xfrm>
+          <a:off x="0" y="0"/>
+          <a:ext cx="0" cy="0"/>
+          <a:chOff x="0" y="0"/>
+          <a:chExt cx="0" cy="0"/>
+        </a:xfrm>
+      </p:grpSpPr>
+      <p:sp>
+        <p:nvSpPr>
+          <p:cNvPr id="2" name="Title 1"/>
+          <p:cNvSpPr>
+            <a:spLocks noGrp="1"/>
+          </p:cNvSpPr>
+          <p:nvPr>
+            <p:ph type="title"/>
+          </p:nvPr>
+        </p:nvSpPr>
+        <p:spPr/>
+        <p:txBody>
+          <a:bodyPr>
+            <a:normAutofit/>
+          </a:bodyPr>
+          <a:lstStyle/>
+          <a:p>
+            <a:r>
+              <a:rPr lang="en-US" dirty="0" smtClean="0"/>
+              <a:t>Distributed system coupling</a:t>
+            </a:r>
+            <a:endParaRPr lang="en-US" dirty="0"/>
+          </a:p>
+        </p:txBody>
+      </p:sp>
+      <p:sp>
+        <p:nvSpPr>
+          <p:cNvPr id="3" name="Content Placeholder 2"/>
+          <p:cNvSpPr>
+            <a:spLocks noGrp="1"/>
+          </p:cNvSpPr>
+          <p:nvPr>
+            <p:ph idx="1"/>
+          </p:nvPr>
+        </p:nvSpPr>
+        <p:spPr>
+          <a:xfrm>
+            <a:off x="457200" y="1600200"/>
+            <a:ext cx="8229600" cy="4920629"/>
+          </a:xfrm>
+        </p:spPr>
+        <p:txBody>
+          <a:bodyPr>
+            <a:normAutofit/>
+          </a:bodyPr>
+          <a:lstStyle/>
+          <a:p>
+            <a:r>
+              <a:rPr lang="en-US" dirty="0" smtClean="0"/>
+              <a:t>You learned about the concept of coupling in the software engineering course </a:t>
+            </a:r>
+          </a:p>
+          <a:p>
+            <a:r>
+              <a:rPr lang="en-US" dirty="0" smtClean="0"/>
+              <a:t>In general, loose coupling is desirable</a:t>
+            </a:r>
+          </a:p>
+          <a:p>
+            <a:pPr lvl="1"/>
+            <a:r>
+              <a:rPr lang="en-US" dirty="0" smtClean="0"/>
+              <a:t>Easier to maintain and replace components</a:t>
+            </a:r>
+          </a:p>
+          <a:p>
+            <a:pPr lvl="1"/>
+            <a:r>
+              <a:rPr lang="en-US" dirty="0" smtClean="0"/>
+              <a:t>Fewer bugs and hidden dependencies</a:t>
+            </a:r>
+          </a:p>
+          <a:p>
+            <a:pPr lvl="1"/>
+            <a:r>
+              <a:rPr lang="en-US" dirty="0" smtClean="0"/>
+              <a:t>More flexible</a:t>
+            </a:r>
+          </a:p>
+          <a:p>
+            <a:r>
+              <a:rPr lang="en-US" dirty="0" smtClean="0"/>
+              <a:t>Loose coupling is highly desirable in distributed systems as well</a:t>
+            </a:r>
+            <a:endParaRPr lang="en-US" dirty="0"/>
+          </a:p>
+          <a:p>
+            <a:pPr marL="457200" lvl="1" indent="0">
+              <a:buNone/>
+            </a:pPr>
+            <a:endParaRPr lang="en-US" dirty="0" smtClean="0"/>
+          </a:p>
+        </p:txBody>
+      </p:sp>
+    </p:spTree>
+    <p:extLst>
+      <p:ext uri="{BB962C8B-B14F-4D97-AF65-F5344CB8AC3E}">
+        <p14:creationId xmlns:p14="http://schemas.microsoft.com/office/powerpoint/2010/main" val="3666338030"/>
+      </p:ext>
+    </p:extLst>
+  </p:cSld>
+  <p:clrMapOvr>
+    <a:masterClrMapping/>
+  </p:clrMapOvr>
+</p:sld>
+</file>
+
+<file path=ppt/slides/slide27.xml><?xml version="1.0" encoding="utf-8"?>
+<p:sld xmlns:a="http://schemas.openxmlformats.org/drawingml/2006/main" xmlns:r="http://schemas.openxmlformats.org/officeDocument/2006/relationships" xmlns:p="http://schemas.openxmlformats.org/presentationml/2006/main">
+  <p:cSld>
+    <p:spTree>
+      <p:nvGrpSpPr>
+        <p:cNvPr id="1" name=""/>
+        <p:cNvGrpSpPr/>
+        <p:nvPr/>
+      </p:nvGrpSpPr>
+      <p:grpSpPr>
+        <a:xfrm>
+          <a:off x="0" y="0"/>
+          <a:ext cx="0" cy="0"/>
+          <a:chOff x="0" y="0"/>
+          <a:chExt cx="0" cy="0"/>
+        </a:xfrm>
+      </p:grpSpPr>
+      <p:sp>
+        <p:nvSpPr>
+          <p:cNvPr id="2" name="Title 1"/>
+          <p:cNvSpPr>
+            <a:spLocks noGrp="1"/>
+          </p:cNvSpPr>
+          <p:nvPr>
+            <p:ph type="title"/>
+          </p:nvPr>
+        </p:nvSpPr>
+        <p:spPr/>
+        <p:txBody>
+          <a:bodyPr>
+            <a:normAutofit fontScale="90000"/>
+          </a:bodyPr>
+          <a:lstStyle/>
+          <a:p>
+            <a:r>
+              <a:rPr lang="en-US" dirty="0" smtClean="0"/>
+              <a:t>Scaling performance of distributed systems</a:t>
+            </a:r>
+            <a:endParaRPr lang="en-US" dirty="0"/>
+          </a:p>
+        </p:txBody>
+      </p:sp>
+      <p:sp>
+        <p:nvSpPr>
+          <p:cNvPr id="3" name="Content Placeholder 2"/>
+          <p:cNvSpPr>
+            <a:spLocks noGrp="1"/>
+          </p:cNvSpPr>
+          <p:nvPr>
+            <p:ph idx="1"/>
+          </p:nvPr>
+        </p:nvSpPr>
+        <p:spPr>
+          <a:xfrm>
+            <a:off x="457200" y="1600200"/>
+            <a:ext cx="8229600" cy="4920629"/>
+          </a:xfrm>
+        </p:spPr>
+        <p:txBody>
+          <a:bodyPr>
+            <a:normAutofit/>
+          </a:bodyPr>
+          <a:lstStyle/>
+          <a:p>
+            <a:r>
+              <a:rPr lang="en-US" dirty="0" smtClean="0"/>
               <a:t>The speed of small systems cannot easily be translated to large distributed systems</a:t>
             </a:r>
           </a:p>
@@ -5558,15 +5759,15 @@
             </a:r>
             <a:r>
               <a:rPr lang="en-US" dirty="0" smtClean="0"/>
-              <a:t>etwork and disk I/O is orders of magnitude slower than </a:t>
-            </a:r>
-            <a:r>
-              <a:rPr lang="en-US" dirty="0" err="1" smtClean="0"/>
-              <a:t>cpu</a:t>
-            </a:r>
-            <a:r>
-              <a:rPr lang="en-US" dirty="0" smtClean="0"/>
-              <a:t> and memory access</a:t>
+              <a:t>etwork and disk I/O is orders of magnitude slower </a:t>
+            </a:r>
+            <a:r>
+              <a:rPr lang="en-US" smtClean="0"/>
+              <a:t>than CPU and </a:t>
+            </a:r>
+            <a:r>
+              <a:rPr lang="en-US" dirty="0" smtClean="0"/>
+              <a:t>memory access</a:t>
             </a:r>
           </a:p>
           <a:p>
@@ -5608,7 +5809,61 @@
 </p:sld>
 </file>
 
-<file path=ppt/slides/slide26.xml><?xml version="1.0" encoding="utf-8"?>
+<file path=ppt/slides/slide28.xml><?xml version="1.0" encoding="utf-8"?>
+<p:sld xmlns:a="http://schemas.openxmlformats.org/drawingml/2006/main" xmlns:r="http://schemas.openxmlformats.org/officeDocument/2006/relationships" xmlns:p="http://schemas.openxmlformats.org/presentationml/2006/main">
+  <p:cSld>
+    <p:spTree>
+      <p:nvGrpSpPr>
+        <p:cNvPr id="1" name=""/>
+        <p:cNvGrpSpPr/>
+        <p:nvPr/>
+      </p:nvGrpSpPr>
+      <p:grpSpPr>
+        <a:xfrm>
+          <a:off x="0" y="0"/>
+          <a:ext cx="0" cy="0"/>
+          <a:chOff x="0" y="0"/>
+          <a:chExt cx="0" cy="0"/>
+        </a:xfrm>
+      </p:grpSpPr>
+      <p:pic>
+        <p:nvPicPr>
+          <p:cNvPr id="9" name="Picture 8"/>
+          <p:cNvPicPr>
+            <a:picLocks noChangeAspect="1"/>
+          </p:cNvPicPr>
+          <p:nvPr/>
+        </p:nvPicPr>
+        <p:blipFill>
+          <a:blip r:embed="rId2"/>
+          <a:stretch>
+            <a:fillRect/>
+          </a:stretch>
+        </p:blipFill>
+        <p:spPr>
+          <a:xfrm>
+            <a:off x="520700" y="381000"/>
+            <a:ext cx="8102600" cy="6083300"/>
+          </a:xfrm>
+          <a:prstGeom prst="rect">
+            <a:avLst/>
+          </a:prstGeom>
+        </p:spPr>
+      </p:pic>
+    </p:spTree>
+    <p:extLst>
+      <p:ext uri="{BB962C8B-B14F-4D97-AF65-F5344CB8AC3E}">
+        <p14:creationId xmlns:p14="http://schemas.microsoft.com/office/powerpoint/2010/main" val="3896508063"/>
+      </p:ext>
+    </p:extLst>
+  </p:cSld>
+  <p:clrMapOvr>
+    <a:masterClrMapping/>
+  </p:clrMapOvr>
+</p:sld>
+</file>
+
+<file path=ppt/slides/slide29.xml><?xml version="1.0" encoding="utf-8"?>
 <p:sld xmlns:a="http://schemas.openxmlformats.org/drawingml/2006/main" xmlns:r="http://schemas.openxmlformats.org/officeDocument/2006/relationships" xmlns:p="http://schemas.openxmlformats.org/presentationml/2006/main">
   <p:cSld>
     <p:spTree>
@@ -5866,430 +6121,6 @@
 </p:sld>
 </file>
 
-<file path=ppt/slides/slide27.xml><?xml version="1.0" encoding="utf-8"?>
-<p:sld xmlns:a="http://schemas.openxmlformats.org/drawingml/2006/main" xmlns:r="http://schemas.openxmlformats.org/officeDocument/2006/relationships" xmlns:p="http://schemas.openxmlformats.org/presentationml/2006/main">
-  <p:cSld>
-    <p:spTree>
-      <p:nvGrpSpPr>
-        <p:cNvPr id="1" name=""/>
-        <p:cNvGrpSpPr/>
-        <p:nvPr/>
-      </p:nvGrpSpPr>
-      <p:grpSpPr>
-        <a:xfrm>
-          <a:off x="0" y="0"/>
-          <a:ext cx="0" cy="0"/>
-          <a:chOff x="0" y="0"/>
-          <a:chExt cx="0" cy="0"/>
-        </a:xfrm>
-      </p:grpSpPr>
-      <p:sp>
-        <p:nvSpPr>
-          <p:cNvPr id="2" name="Title 1"/>
-          <p:cNvSpPr>
-            <a:spLocks noGrp="1"/>
-          </p:cNvSpPr>
-          <p:nvPr>
-            <p:ph type="title"/>
-          </p:nvPr>
-        </p:nvSpPr>
-        <p:spPr/>
-        <p:txBody>
-          <a:bodyPr>
-            <a:normAutofit/>
-          </a:bodyPr>
-          <a:lstStyle/>
-          <a:p>
-            <a:r>
-              <a:rPr lang="en-US" dirty="0" smtClean="0"/>
-              <a:t>Virtualization</a:t>
-            </a:r>
-            <a:endParaRPr lang="en-US" dirty="0"/>
-          </a:p>
-        </p:txBody>
-      </p:sp>
-      <p:sp>
-        <p:nvSpPr>
-          <p:cNvPr id="3" name="Content Placeholder 2"/>
-          <p:cNvSpPr>
-            <a:spLocks noGrp="1"/>
-          </p:cNvSpPr>
-          <p:nvPr>
-            <p:ph idx="1"/>
-          </p:nvPr>
-        </p:nvSpPr>
-        <p:spPr>
-          <a:xfrm>
-            <a:off x="457200" y="1600200"/>
-            <a:ext cx="8229600" cy="4920629"/>
-          </a:xfrm>
-        </p:spPr>
-        <p:txBody>
-          <a:bodyPr>
-            <a:normAutofit fontScale="85000" lnSpcReduction="10000"/>
-          </a:bodyPr>
-          <a:lstStyle/>
-          <a:p>
-            <a:r>
-              <a:rPr lang="en-US" dirty="0" smtClean="0"/>
-              <a:t>Problem: It’s hard for IT organizations to determine the right-size server to support a required stack</a:t>
-            </a:r>
-          </a:p>
-          <a:p>
-            <a:pPr lvl="1"/>
-            <a:r>
-              <a:rPr lang="en-US" dirty="0" smtClean="0"/>
-              <a:t>How much CPU, memory, and network?</a:t>
-            </a:r>
-          </a:p>
-          <a:p>
-            <a:pPr lvl="1"/>
-            <a:r>
-              <a:rPr lang="en-US" dirty="0" smtClean="0"/>
-              <a:t>Selected server is either going to be oversized or undersized</a:t>
-            </a:r>
-          </a:p>
-          <a:p>
-            <a:pPr lvl="1"/>
-            <a:r>
-              <a:rPr lang="en-US" dirty="0" smtClean="0"/>
-              <a:t>Common to see servers with 10% Avg. </a:t>
-            </a:r>
-            <a:r>
-              <a:rPr lang="en-US" dirty="0" err="1" smtClean="0"/>
-              <a:t>CPUutilization</a:t>
-            </a:r>
-            <a:r>
-              <a:rPr lang="en-US" dirty="0" smtClean="0"/>
-              <a:t>, 90% of system capacity wasted!</a:t>
-            </a:r>
-          </a:p>
-          <a:p>
-            <a:pPr lvl="1"/>
-            <a:endParaRPr lang="en-US" dirty="0" smtClean="0"/>
-          </a:p>
-          <a:p>
-            <a:r>
-              <a:rPr lang="en-US" dirty="0" smtClean="0"/>
-              <a:t>Problem: What happens when IT needs to move or upgrade stack to a bigger server?</a:t>
-            </a:r>
-          </a:p>
-          <a:p>
-            <a:pPr lvl="1"/>
-            <a:r>
-              <a:rPr lang="en-US" dirty="0" smtClean="0"/>
-              <a:t>Painful process of building new server, installing applications and moving data (forklift upgrade)</a:t>
-            </a:r>
-            <a:endParaRPr lang="en-US" dirty="0"/>
-          </a:p>
-          <a:p>
-            <a:endParaRPr lang="en-US" dirty="0" smtClean="0"/>
-          </a:p>
-          <a:p>
-            <a:endParaRPr lang="en-US" dirty="0"/>
-          </a:p>
-          <a:p>
-            <a:endParaRPr lang="en-US" dirty="0" smtClean="0"/>
-          </a:p>
-          <a:p>
-            <a:endParaRPr lang="en-US" dirty="0"/>
-          </a:p>
-          <a:p>
-            <a:pPr marL="0" indent="0">
-              <a:buNone/>
-            </a:pPr>
-            <a:endParaRPr lang="en-US" dirty="0"/>
-          </a:p>
-          <a:p>
-            <a:endParaRPr lang="en-US" dirty="0" smtClean="0"/>
-          </a:p>
-        </p:txBody>
-      </p:sp>
-    </p:spTree>
-    <p:extLst>
-      <p:ext uri="{BB962C8B-B14F-4D97-AF65-F5344CB8AC3E}">
-        <p14:creationId xmlns:p14="http://schemas.microsoft.com/office/powerpoint/2010/main" val="3877920237"/>
-      </p:ext>
-    </p:extLst>
-  </p:cSld>
-  <p:clrMapOvr>
-    <a:masterClrMapping/>
-  </p:clrMapOvr>
-</p:sld>
-</file>
-
-<file path=ppt/slides/slide28.xml><?xml version="1.0" encoding="utf-8"?>
-<p:sld xmlns:a="http://schemas.openxmlformats.org/drawingml/2006/main" xmlns:r="http://schemas.openxmlformats.org/officeDocument/2006/relationships" xmlns:p="http://schemas.openxmlformats.org/presentationml/2006/main">
-  <p:cSld>
-    <p:spTree>
-      <p:nvGrpSpPr>
-        <p:cNvPr id="1" name=""/>
-        <p:cNvGrpSpPr/>
-        <p:nvPr/>
-      </p:nvGrpSpPr>
-      <p:grpSpPr>
-        <a:xfrm>
-          <a:off x="0" y="0"/>
-          <a:ext cx="0" cy="0"/>
-          <a:chOff x="0" y="0"/>
-          <a:chExt cx="0" cy="0"/>
-        </a:xfrm>
-      </p:grpSpPr>
-      <p:sp>
-        <p:nvSpPr>
-          <p:cNvPr id="2" name="Title 1"/>
-          <p:cNvSpPr>
-            <a:spLocks noGrp="1"/>
-          </p:cNvSpPr>
-          <p:nvPr>
-            <p:ph type="title"/>
-          </p:nvPr>
-        </p:nvSpPr>
-        <p:spPr/>
-        <p:txBody>
-          <a:bodyPr>
-            <a:normAutofit/>
-          </a:bodyPr>
-          <a:lstStyle/>
-          <a:p>
-            <a:r>
-              <a:rPr lang="en-US" dirty="0" smtClean="0"/>
-              <a:t>Virtualization</a:t>
-            </a:r>
-            <a:endParaRPr lang="en-US" dirty="0"/>
-          </a:p>
-        </p:txBody>
-      </p:sp>
-      <p:sp>
-        <p:nvSpPr>
-          <p:cNvPr id="3" name="Content Placeholder 2"/>
-          <p:cNvSpPr>
-            <a:spLocks noGrp="1"/>
-          </p:cNvSpPr>
-          <p:nvPr>
-            <p:ph idx="1"/>
-          </p:nvPr>
-        </p:nvSpPr>
-        <p:spPr>
-          <a:xfrm>
-            <a:off x="457200" y="1600200"/>
-            <a:ext cx="8229600" cy="4920629"/>
-          </a:xfrm>
-        </p:spPr>
-        <p:txBody>
-          <a:bodyPr>
-            <a:normAutofit/>
-          </a:bodyPr>
-          <a:lstStyle/>
-          <a:p>
-            <a:r>
-              <a:rPr lang="en-US" dirty="0" smtClean="0"/>
-              <a:t>Problem: How does IT partition one customer from another?</a:t>
-            </a:r>
-          </a:p>
-          <a:p>
-            <a:pPr lvl="1"/>
-            <a:r>
-              <a:rPr lang="en-US" dirty="0" smtClean="0"/>
-              <a:t>Just buy another server </a:t>
-            </a:r>
-            <a:r>
-              <a:rPr lang="en-US" dirty="0" smtClean="0">
-                <a:sym typeface="Wingdings"/>
-              </a:rPr>
-              <a:t></a:t>
-            </a:r>
-          </a:p>
-          <a:p>
-            <a:pPr lvl="1"/>
-            <a:r>
-              <a:rPr lang="en-US" dirty="0" smtClean="0">
-                <a:sym typeface="Wingdings"/>
-              </a:rPr>
-              <a:t>Expensive to scale when every stack needs a separate physical server</a:t>
-            </a:r>
-          </a:p>
-          <a:p>
-            <a:endParaRPr lang="en-US" dirty="0" smtClean="0"/>
-          </a:p>
-          <a:p>
-            <a:endParaRPr lang="en-US" dirty="0" smtClean="0"/>
-          </a:p>
-          <a:p>
-            <a:endParaRPr lang="en-US" dirty="0"/>
-          </a:p>
-          <a:p>
-            <a:endParaRPr lang="en-US" dirty="0" smtClean="0"/>
-          </a:p>
-          <a:p>
-            <a:endParaRPr lang="en-US" dirty="0"/>
-          </a:p>
-          <a:p>
-            <a:pPr marL="0" indent="0">
-              <a:buNone/>
-            </a:pPr>
-            <a:endParaRPr lang="en-US" dirty="0"/>
-          </a:p>
-          <a:p>
-            <a:endParaRPr lang="en-US" dirty="0" smtClean="0"/>
-          </a:p>
-        </p:txBody>
-      </p:sp>
-    </p:spTree>
-    <p:extLst>
-      <p:ext uri="{BB962C8B-B14F-4D97-AF65-F5344CB8AC3E}">
-        <p14:creationId xmlns:p14="http://schemas.microsoft.com/office/powerpoint/2010/main" val="3417819335"/>
-      </p:ext>
-    </p:extLst>
-  </p:cSld>
-  <p:clrMapOvr>
-    <a:masterClrMapping/>
-  </p:clrMapOvr>
-</p:sld>
-</file>
-
-<file path=ppt/slides/slide29.xml><?xml version="1.0" encoding="utf-8"?>
-<p:sld xmlns:a="http://schemas.openxmlformats.org/drawingml/2006/main" xmlns:r="http://schemas.openxmlformats.org/officeDocument/2006/relationships" xmlns:p="http://schemas.openxmlformats.org/presentationml/2006/main">
-  <p:cSld>
-    <p:spTree>
-      <p:nvGrpSpPr>
-        <p:cNvPr id="1" name=""/>
-        <p:cNvGrpSpPr/>
-        <p:nvPr/>
-      </p:nvGrpSpPr>
-      <p:grpSpPr>
-        <a:xfrm>
-          <a:off x="0" y="0"/>
-          <a:ext cx="0" cy="0"/>
-          <a:chOff x="0" y="0"/>
-          <a:chExt cx="0" cy="0"/>
-        </a:xfrm>
-      </p:grpSpPr>
-      <p:sp>
-        <p:nvSpPr>
-          <p:cNvPr id="2" name="Title 1"/>
-          <p:cNvSpPr>
-            <a:spLocks noGrp="1"/>
-          </p:cNvSpPr>
-          <p:nvPr>
-            <p:ph type="title"/>
-          </p:nvPr>
-        </p:nvSpPr>
-        <p:spPr/>
-        <p:txBody>
-          <a:bodyPr>
-            <a:normAutofit/>
-          </a:bodyPr>
-          <a:lstStyle/>
-          <a:p>
-            <a:r>
-              <a:rPr lang="en-US" dirty="0" smtClean="0"/>
-              <a:t>Virtualization</a:t>
-            </a:r>
-            <a:endParaRPr lang="en-US" dirty="0"/>
-          </a:p>
-        </p:txBody>
-      </p:sp>
-      <p:sp>
-        <p:nvSpPr>
-          <p:cNvPr id="3" name="Content Placeholder 2"/>
-          <p:cNvSpPr>
-            <a:spLocks noGrp="1"/>
-          </p:cNvSpPr>
-          <p:nvPr>
-            <p:ph idx="1"/>
-          </p:nvPr>
-        </p:nvSpPr>
-        <p:spPr>
-          <a:xfrm>
-            <a:off x="457200" y="1600200"/>
-            <a:ext cx="8229600" cy="4920629"/>
-          </a:xfrm>
-        </p:spPr>
-        <p:txBody>
-          <a:bodyPr>
-            <a:normAutofit fontScale="92500" lnSpcReduction="20000"/>
-          </a:bodyPr>
-          <a:lstStyle/>
-          <a:p>
-            <a:r>
-              <a:rPr lang="en-US" dirty="0" smtClean="0"/>
-              <a:t>Computers basically just execute code statements and address memory</a:t>
-            </a:r>
-          </a:p>
-          <a:p>
-            <a:pPr lvl="1"/>
-            <a:r>
-              <a:rPr lang="en-US" dirty="0" smtClean="0"/>
-              <a:t>Manipulating memory in the right patterns and sequences allows us to create operating systems and applications</a:t>
-            </a:r>
-          </a:p>
-          <a:p>
-            <a:pPr lvl="1"/>
-            <a:r>
-              <a:rPr lang="en-US" dirty="0" smtClean="0"/>
-              <a:t>Program code can be designed to emulate a physical computer</a:t>
-            </a:r>
-          </a:p>
-          <a:p>
-            <a:r>
-              <a:rPr lang="en-US" dirty="0" smtClean="0"/>
-              <a:t>“Virtualization turns hardware into software.”</a:t>
-            </a:r>
-          </a:p>
-          <a:p>
-            <a:pPr lvl="1"/>
-            <a:r>
-              <a:rPr lang="en-US" dirty="0" smtClean="0"/>
-              <a:t>Allows us to run multiple operating systems and stacks of applications on a single physical server</a:t>
-            </a:r>
-          </a:p>
-          <a:p>
-            <a:pPr lvl="1"/>
-            <a:r>
-              <a:rPr lang="en-US" dirty="0" smtClean="0"/>
-              <a:t>Multiple stacks have logical partitions from a process, memory, and networking perspective</a:t>
-            </a:r>
-          </a:p>
-          <a:p>
-            <a:endParaRPr lang="en-US" dirty="0" smtClean="0"/>
-          </a:p>
-          <a:p>
-            <a:endParaRPr lang="en-US" dirty="0" smtClean="0"/>
-          </a:p>
-          <a:p>
-            <a:endParaRPr lang="en-US" dirty="0"/>
-          </a:p>
-          <a:p>
-            <a:endParaRPr lang="en-US" dirty="0" smtClean="0"/>
-          </a:p>
-          <a:p>
-            <a:endParaRPr lang="en-US" dirty="0"/>
-          </a:p>
-          <a:p>
-            <a:pPr marL="0" indent="0">
-              <a:buNone/>
-            </a:pPr>
-            <a:endParaRPr lang="en-US" dirty="0"/>
-          </a:p>
-          <a:p>
-            <a:endParaRPr lang="en-US" dirty="0" smtClean="0"/>
-          </a:p>
-        </p:txBody>
-      </p:sp>
-    </p:spTree>
-    <p:extLst>
-      <p:ext uri="{BB962C8B-B14F-4D97-AF65-F5344CB8AC3E}">
-        <p14:creationId xmlns:p14="http://schemas.microsoft.com/office/powerpoint/2010/main" val="4270857555"/>
-      </p:ext>
-    </p:extLst>
-  </p:cSld>
-  <p:clrMapOvr>
-    <a:masterClrMapping/>
-  </p:clrMapOvr>
-</p:sld>
-</file>
-
 <file path=ppt/slides/slide3.xml><?xml version="1.0" encoding="utf-8"?>
 <p:sld xmlns:a="http://schemas.openxmlformats.org/drawingml/2006/main" xmlns:r="http://schemas.openxmlformats.org/officeDocument/2006/relationships" xmlns:p="http://schemas.openxmlformats.org/presentationml/2006/main">
   <p:cSld>
@@ -6440,57 +6271,61 @@
         </p:spPr>
         <p:txBody>
           <a:bodyPr>
-            <a:normAutofit/>
+            <a:normAutofit fontScale="85000" lnSpcReduction="10000"/>
           </a:bodyPr>
           <a:lstStyle/>
           <a:p>
             <a:r>
               <a:rPr lang="en-US" dirty="0" smtClean="0"/>
-              <a:t>4 things that gave rise to server-based virtualization:</a:t>
-            </a:r>
-          </a:p>
-          <a:p>
-            <a:pPr lvl="1"/>
-            <a:r>
-              <a:rPr lang="en-US" dirty="0" smtClean="0"/>
-              <a:t>Faster, multi-socket CPU boards</a:t>
-            </a:r>
-          </a:p>
-          <a:p>
-            <a:pPr lvl="2"/>
-            <a:r>
-              <a:rPr lang="en-US" dirty="0" smtClean="0"/>
-              <a:t>Powerful old mainframes supported virtualization, but Intel/AMD-based servers were not powerful enough until late 90’s. </a:t>
-            </a:r>
-          </a:p>
-          <a:p>
-            <a:pPr lvl="1"/>
-            <a:r>
-              <a:rPr lang="en-US" dirty="0" smtClean="0"/>
-              <a:t>Faster, cheaper memory</a:t>
-            </a:r>
-          </a:p>
-          <a:p>
-            <a:pPr lvl="1"/>
-            <a:r>
-              <a:rPr lang="en-US" dirty="0" smtClean="0"/>
-              <a:t>Faster network storage (NAS/Fiber-channel)</a:t>
-            </a:r>
-          </a:p>
-          <a:p>
-            <a:pPr lvl="1"/>
-            <a:r>
-              <a:rPr lang="en-US" dirty="0" smtClean="0"/>
-              <a:t>Development of </a:t>
+              <a:t>Problem: It’s hard for IT organizations to determine the right-size server to support a required stack</a:t>
+            </a:r>
+          </a:p>
+          <a:p>
+            <a:pPr lvl="1"/>
+            <a:r>
+              <a:rPr lang="en-US" dirty="0" smtClean="0"/>
+              <a:t>How much CPU, memory, and network?</a:t>
+            </a:r>
+          </a:p>
+          <a:p>
+            <a:pPr lvl="1"/>
+            <a:r>
+              <a:rPr lang="en-US" dirty="0" smtClean="0"/>
+              <a:t>Selected server is either going to be oversized or undersized</a:t>
+            </a:r>
+          </a:p>
+          <a:p>
+            <a:pPr lvl="1"/>
+            <a:r>
+              <a:rPr lang="en-US" dirty="0" smtClean="0"/>
+              <a:t>Common to see servers with 10% Avg. </a:t>
             </a:r>
             <a:r>
               <a:rPr lang="en-US" dirty="0" err="1" smtClean="0"/>
-              <a:t>VMWare</a:t>
-            </a:r>
-            <a:r>
-              <a:rPr lang="en-US" dirty="0" smtClean="0"/>
-              <a:t> software</a:t>
-            </a:r>
+              <a:t>CPUutilization</a:t>
+            </a:r>
+            <a:r>
+              <a:rPr lang="en-US" dirty="0" smtClean="0"/>
+              <a:t>, 90% of system capacity wasted!</a:t>
+            </a:r>
+          </a:p>
+          <a:p>
+            <a:pPr lvl="1"/>
+            <a:endParaRPr lang="en-US" dirty="0" smtClean="0"/>
+          </a:p>
+          <a:p>
+            <a:r>
+              <a:rPr lang="en-US" dirty="0" smtClean="0"/>
+              <a:t>Problem: What happens when IT needs to move or upgrade stack to a bigger server?</a:t>
+            </a:r>
+          </a:p>
+          <a:p>
+            <a:pPr lvl="1"/>
+            <a:r>
+              <a:rPr lang="en-US" dirty="0" smtClean="0"/>
+              <a:t>Painful process of building new server, installing applications and moving data (forklift upgrade)</a:t>
+            </a:r>
+            <a:endParaRPr lang="en-US" dirty="0"/>
           </a:p>
           <a:p>
             <a:endParaRPr lang="en-US" dirty="0" smtClean="0"/>
@@ -6518,7 +6353,7 @@
     </p:spTree>
     <p:extLst>
       <p:ext uri="{BB962C8B-B14F-4D97-AF65-F5344CB8AC3E}">
-        <p14:creationId xmlns:p14="http://schemas.microsoft.com/office/powerpoint/2010/main" val="1840026850"/>
+        <p14:creationId xmlns:p14="http://schemas.microsoft.com/office/powerpoint/2010/main" val="3877920237"/>
       </p:ext>
     </p:extLst>
   </p:cSld>
@@ -6564,7 +6399,7 @@
           <a:p>
             <a:r>
               <a:rPr lang="en-US" dirty="0" smtClean="0"/>
-              <a:t>Virtualization solves problems</a:t>
+              <a:t>Virtualization</a:t>
             </a:r>
             <a:endParaRPr lang="en-US" dirty="0"/>
           </a:p>
@@ -6594,43 +6429,35 @@
           <a:p>
             <a:r>
               <a:rPr lang="en-US" dirty="0" smtClean="0"/>
-              <a:t>Virtualization allows multiple stacks to run on one physical machine</a:t>
-            </a:r>
-          </a:p>
-          <a:p>
-            <a:pPr lvl="1"/>
-            <a:r>
-              <a:rPr lang="en-US" dirty="0" smtClean="0"/>
-              <a:t>Increases average resource utilization from 10% to 80-90%</a:t>
-            </a:r>
-          </a:p>
-          <a:p>
-            <a:pPr lvl="1"/>
-            <a:r>
-              <a:rPr lang="en-US" dirty="0" smtClean="0"/>
-              <a:t>Reduces physical footprint of servers</a:t>
-            </a:r>
-          </a:p>
-          <a:p>
-            <a:pPr lvl="1"/>
-            <a:r>
-              <a:rPr lang="en-US" dirty="0" smtClean="0"/>
-              <a:t>Greener approach</a:t>
-            </a:r>
-          </a:p>
-          <a:p>
-            <a:pPr lvl="1"/>
-            <a:r>
-              <a:rPr lang="en-US" dirty="0" smtClean="0"/>
-              <a:t>Sometimes we call this phenomenon </a:t>
-            </a:r>
-            <a:r>
-              <a:rPr lang="en-US" i="1" dirty="0" smtClean="0"/>
-              <a:t>server compression</a:t>
-            </a:r>
-          </a:p>
-          <a:p>
-            <a:pPr lvl="1"/>
+              <a:t>Problem: How does IT partition one customer from another?</a:t>
+            </a:r>
+          </a:p>
+          <a:p>
+            <a:pPr lvl="1"/>
+            <a:r>
+              <a:rPr lang="en-US" dirty="0" smtClean="0"/>
+              <a:t>Just buy another server </a:t>
+            </a:r>
+            <a:r>
+              <a:rPr lang="en-US" dirty="0" smtClean="0">
+                <a:sym typeface="Wingdings"/>
+              </a:rPr>
+              <a:t></a:t>
+            </a:r>
+          </a:p>
+          <a:p>
+            <a:pPr lvl="1"/>
+            <a:r>
+              <a:rPr lang="en-US" dirty="0" smtClean="0">
+                <a:sym typeface="Wingdings"/>
+              </a:rPr>
+              <a:t>Expensive to scale when every stack needs a separate physical server</a:t>
+            </a:r>
+          </a:p>
+          <a:p>
+            <a:endParaRPr lang="en-US" dirty="0" smtClean="0"/>
+          </a:p>
+          <a:p>
             <a:endParaRPr lang="en-US" dirty="0" smtClean="0"/>
           </a:p>
           <a:p>
@@ -6656,7 +6483,7 @@
     </p:spTree>
     <p:extLst>
       <p:ext uri="{BB962C8B-B14F-4D97-AF65-F5344CB8AC3E}">
-        <p14:creationId xmlns:p14="http://schemas.microsoft.com/office/powerpoint/2010/main" val="370587444"/>
+        <p14:creationId xmlns:p14="http://schemas.microsoft.com/office/powerpoint/2010/main" val="3417819335"/>
       </p:ext>
     </p:extLst>
   </p:cSld>
@@ -6702,7 +6529,7 @@
           <a:p>
             <a:r>
               <a:rPr lang="en-US" dirty="0" smtClean="0"/>
-              <a:t>Virtualization solves problems</a:t>
+              <a:t>Virtualization</a:t>
             </a:r>
             <a:endParaRPr lang="en-US" dirty="0"/>
           </a:p>
@@ -6726,34 +6553,54 @@
         </p:spPr>
         <p:txBody>
           <a:bodyPr>
-            <a:normAutofit/>
+            <a:normAutofit fontScale="92500" lnSpcReduction="20000"/>
           </a:bodyPr>
           <a:lstStyle/>
           <a:p>
             <a:r>
               <a:rPr lang="en-US" dirty="0" smtClean="0"/>
-              <a:t>Servers are turned into software</a:t>
-            </a:r>
-          </a:p>
-          <a:p>
-            <a:pPr lvl="1"/>
-            <a:r>
-              <a:rPr lang="en-US" dirty="0" smtClean="0"/>
-              <a:t>It’s easier to move software around</a:t>
-            </a:r>
-          </a:p>
-          <a:p>
-            <a:pPr lvl="1"/>
-            <a:r>
-              <a:rPr lang="en-US" dirty="0" smtClean="0"/>
-              <a:t>Easy to move a stack from an older physical server to a newer physical server</a:t>
-            </a:r>
-          </a:p>
-          <a:p>
-            <a:r>
-              <a:rPr lang="en-US" dirty="0" smtClean="0"/>
-              <a:t>No need to purchase a separate server for each customer because virtualization provides partitioning.</a:t>
-            </a:r>
+              <a:t>Computers basically just execute code statements and address memory</a:t>
+            </a:r>
+          </a:p>
+          <a:p>
+            <a:pPr lvl="1"/>
+            <a:r>
+              <a:rPr lang="en-US" dirty="0" smtClean="0"/>
+              <a:t>Manipulating memory in the right patterns and sequences allows us to create operating systems and applications</a:t>
+            </a:r>
+          </a:p>
+          <a:p>
+            <a:pPr lvl="1"/>
+            <a:r>
+              <a:rPr lang="en-US" dirty="0" smtClean="0"/>
+              <a:t>Program code can be designed to emulate a physical computer</a:t>
+            </a:r>
+          </a:p>
+          <a:p>
+            <a:r>
+              <a:rPr lang="en-US" dirty="0" smtClean="0"/>
+              <a:t>“Virtualization turns hardware into software.”</a:t>
+            </a:r>
+          </a:p>
+          <a:p>
+            <a:pPr lvl="1"/>
+            <a:r>
+              <a:rPr lang="en-US" dirty="0" smtClean="0"/>
+              <a:t>Allows us to run multiple operating systems and stacks of applications on a single physical server</a:t>
+            </a:r>
+          </a:p>
+          <a:p>
+            <a:pPr lvl="1"/>
+            <a:r>
+              <a:rPr lang="en-US" dirty="0" smtClean="0"/>
+              <a:t>Multiple stacks have logical partitions from a process, memory, and networking perspective</a:t>
+            </a:r>
+          </a:p>
+          <a:p>
+            <a:endParaRPr lang="en-US" dirty="0" smtClean="0"/>
+          </a:p>
+          <a:p>
+            <a:endParaRPr lang="en-US" dirty="0" smtClean="0"/>
           </a:p>
           <a:p>
             <a:endParaRPr lang="en-US" dirty="0"/>
@@ -6778,7 +6625,7 @@
     </p:spTree>
     <p:extLst>
       <p:ext uri="{BB962C8B-B14F-4D97-AF65-F5344CB8AC3E}">
-        <p14:creationId xmlns:p14="http://schemas.microsoft.com/office/powerpoint/2010/main" val="2273451257"/>
+        <p14:creationId xmlns:p14="http://schemas.microsoft.com/office/powerpoint/2010/main" val="4270857555"/>
       </p:ext>
     </p:extLst>
   </p:cSld>
@@ -6824,7 +6671,7 @@
           <a:p>
             <a:r>
               <a:rPr lang="en-US" dirty="0" smtClean="0"/>
-              <a:t>Virtualization Types</a:t>
+              <a:t>Virtualization</a:t>
             </a:r>
             <a:endParaRPr lang="en-US" dirty="0"/>
           </a:p>
@@ -6848,49 +6695,60 @@
         </p:spPr>
         <p:txBody>
           <a:bodyPr>
-            <a:normAutofit fontScale="92500" lnSpcReduction="10000"/>
+            <a:normAutofit/>
           </a:bodyPr>
           <a:lstStyle/>
           <a:p>
             <a:r>
               <a:rPr lang="en-US" dirty="0" smtClean="0"/>
-              <a:t>First, some definitions:</a:t>
-            </a:r>
-          </a:p>
-          <a:p>
-            <a:pPr lvl="1"/>
-            <a:r>
-              <a:rPr lang="en-US" dirty="0" smtClean="0"/>
-              <a:t>Host machine: physical server that supports multiple stacks</a:t>
-            </a:r>
-          </a:p>
-          <a:p>
-            <a:pPr lvl="1"/>
-            <a:r>
-              <a:rPr lang="en-US" dirty="0" smtClean="0"/>
-              <a:t>Virtual machine: virtualized server instance running on a host machine (also known as an instance)</a:t>
-            </a:r>
-          </a:p>
-          <a:p>
-            <a:pPr lvl="1"/>
-            <a:r>
-              <a:rPr lang="en-US" dirty="0" smtClean="0"/>
-              <a:t>Host OS: operating system running on a bare-metal server</a:t>
-            </a:r>
-          </a:p>
-          <a:p>
-            <a:pPr lvl="1"/>
-            <a:r>
-              <a:rPr lang="en-US" dirty="0" smtClean="0"/>
-              <a:t>Guest OS: operating system running on a virtual machine</a:t>
-            </a:r>
-          </a:p>
-          <a:p>
-            <a:pPr lvl="1"/>
-            <a:r>
-              <a:rPr lang="en-US" dirty="0" smtClean="0"/>
-              <a:t>Hypervisor: Software that emulates and manages the communication between virtual machines and the physical server</a:t>
-            </a:r>
+              <a:t>4 things that gave rise to server-based virtualization:</a:t>
+            </a:r>
+          </a:p>
+          <a:p>
+            <a:pPr lvl="1"/>
+            <a:r>
+              <a:rPr lang="en-US" dirty="0" smtClean="0"/>
+              <a:t>Faster, multi-socket CPU boards</a:t>
+            </a:r>
+          </a:p>
+          <a:p>
+            <a:pPr lvl="2"/>
+            <a:r>
+              <a:rPr lang="en-US" dirty="0" smtClean="0"/>
+              <a:t>Powerful old mainframes supported virtualization, but Intel/AMD-based servers were not powerful enough until late 90’s. </a:t>
+            </a:r>
+          </a:p>
+          <a:p>
+            <a:pPr lvl="1"/>
+            <a:r>
+              <a:rPr lang="en-US" dirty="0" smtClean="0"/>
+              <a:t>Faster, cheaper memory</a:t>
+            </a:r>
+          </a:p>
+          <a:p>
+            <a:pPr lvl="1"/>
+            <a:r>
+              <a:rPr lang="en-US" dirty="0" smtClean="0"/>
+              <a:t>Faster network storage (NAS/Fiber-channel)</a:t>
+            </a:r>
+          </a:p>
+          <a:p>
+            <a:pPr lvl="1"/>
+            <a:r>
+              <a:rPr lang="en-US" dirty="0" smtClean="0"/>
+              <a:t>Development of </a:t>
+            </a:r>
+            <a:r>
+              <a:rPr lang="en-US" dirty="0" err="1" smtClean="0"/>
+              <a:t>VMWare</a:t>
+            </a:r>
+            <a:r>
+              <a:rPr lang="en-US" dirty="0" smtClean="0"/>
+              <a:t> software</a:t>
+            </a:r>
+          </a:p>
+          <a:p>
+            <a:endParaRPr lang="en-US" dirty="0" smtClean="0"/>
           </a:p>
           <a:p>
             <a:endParaRPr lang="en-US" dirty="0"/>
@@ -6915,7 +6773,7 @@
     </p:spTree>
     <p:extLst>
       <p:ext uri="{BB962C8B-B14F-4D97-AF65-F5344CB8AC3E}">
-        <p14:creationId xmlns:p14="http://schemas.microsoft.com/office/powerpoint/2010/main" val="3992047205"/>
+        <p14:creationId xmlns:p14="http://schemas.microsoft.com/office/powerpoint/2010/main" val="1840026850"/>
       </p:ext>
     </p:extLst>
   </p:cSld>
@@ -6961,7 +6819,7 @@
           <a:p>
             <a:r>
               <a:rPr lang="en-US" dirty="0" smtClean="0"/>
-              <a:t>Virtualization Types</a:t>
+              <a:t>Virtualization solves problems</a:t>
             </a:r>
             <a:endParaRPr lang="en-US" dirty="0"/>
           </a:p>
@@ -6991,61 +6849,46 @@
           <a:p>
             <a:r>
               <a:rPr lang="en-US" dirty="0" smtClean="0"/>
-              <a:t>Hardware virtualization</a:t>
-            </a:r>
-          </a:p>
-          <a:p>
-            <a:pPr lvl="1"/>
-            <a:r>
-              <a:rPr lang="en-US" dirty="0" smtClean="0"/>
-              <a:t>Part of physical server dedicated to a specific stack</a:t>
-            </a:r>
-          </a:p>
-          <a:p>
-            <a:pPr lvl="1"/>
-            <a:r>
-              <a:rPr lang="en-US" dirty="0" smtClean="0"/>
-              <a:t>Big expensive mainframe-type systems</a:t>
-            </a:r>
-          </a:p>
-          <a:p>
-            <a:r>
-              <a:rPr lang="en-US" dirty="0" smtClean="0"/>
-              <a:t>Software virtualization</a:t>
-            </a:r>
-          </a:p>
-          <a:p>
-            <a:pPr lvl="1"/>
-            <a:r>
-              <a:rPr lang="en-US" dirty="0" smtClean="0"/>
-              <a:t>Type 1 Hypervisor</a:t>
-            </a:r>
-          </a:p>
-          <a:p>
-            <a:pPr lvl="2"/>
-            <a:r>
-              <a:rPr lang="en-US" dirty="0" smtClean="0"/>
-              <a:t>Runs on top of the bare-metal server and sits between hardware and operating systems in the stacks</a:t>
-            </a:r>
-          </a:p>
-          <a:p>
-            <a:pPr lvl="2"/>
-            <a:r>
-              <a:rPr lang="en-US" dirty="0" smtClean="0"/>
-              <a:t>Examples: </a:t>
-            </a:r>
-            <a:r>
-              <a:rPr lang="en-US" dirty="0" err="1" smtClean="0"/>
-              <a:t>VMWare</a:t>
-            </a:r>
-            <a:r>
-              <a:rPr lang="en-US" dirty="0" smtClean="0"/>
-              <a:t> ESX, Microsoft Virtual Server, </a:t>
-            </a:r>
-            <a:r>
-              <a:rPr lang="en-US" dirty="0" err="1" smtClean="0"/>
-              <a:t>Xen</a:t>
-            </a:r>
+              <a:t>Virtualization allows multiple stacks to run on one physical machine</a:t>
+            </a:r>
+          </a:p>
+          <a:p>
+            <a:pPr lvl="1"/>
+            <a:r>
+              <a:rPr lang="en-US" dirty="0" smtClean="0"/>
+              <a:t>Increases average resource utilization from 10% to 80-90%</a:t>
+            </a:r>
+          </a:p>
+          <a:p>
+            <a:pPr lvl="1"/>
+            <a:r>
+              <a:rPr lang="en-US" dirty="0" smtClean="0"/>
+              <a:t>Reduces physical footprint of servers</a:t>
+            </a:r>
+          </a:p>
+          <a:p>
+            <a:pPr lvl="1"/>
+            <a:r>
+              <a:rPr lang="en-US" dirty="0" smtClean="0"/>
+              <a:t>Greener approach</a:t>
+            </a:r>
+          </a:p>
+          <a:p>
+            <a:pPr lvl="1"/>
+            <a:r>
+              <a:rPr lang="en-US" dirty="0" smtClean="0"/>
+              <a:t>Sometimes we call this phenomenon </a:t>
+            </a:r>
+            <a:r>
+              <a:rPr lang="en-US" i="1" dirty="0" smtClean="0"/>
+              <a:t>server compression</a:t>
+            </a:r>
+          </a:p>
+          <a:p>
+            <a:pPr lvl="1"/>
+            <a:endParaRPr lang="en-US" dirty="0" smtClean="0"/>
+          </a:p>
+          <a:p>
             <a:endParaRPr lang="en-US" dirty="0"/>
           </a:p>
           <a:p>
@@ -7068,7 +6911,7 @@
     </p:spTree>
     <p:extLst>
       <p:ext uri="{BB962C8B-B14F-4D97-AF65-F5344CB8AC3E}">
-        <p14:creationId xmlns:p14="http://schemas.microsoft.com/office/powerpoint/2010/main" val="4033828629"/>
+        <p14:creationId xmlns:p14="http://schemas.microsoft.com/office/powerpoint/2010/main" val="370587444"/>
       </p:ext>
     </p:extLst>
   </p:cSld>
@@ -7114,7 +6957,7 @@
           <a:p>
             <a:r>
               <a:rPr lang="en-US" dirty="0" smtClean="0"/>
-              <a:t>Virtualization Types</a:t>
+              <a:t>Virtualization solves problems</a:t>
             </a:r>
             <a:endParaRPr lang="en-US" dirty="0"/>
           </a:p>
@@ -7138,146 +6981,59 @@
         </p:spPr>
         <p:txBody>
           <a:bodyPr>
-            <a:normAutofit fontScale="92500"/>
+            <a:normAutofit/>
           </a:bodyPr>
           <a:lstStyle/>
           <a:p>
-            <a:pPr lvl="1"/>
-            <a:r>
-              <a:rPr lang="en-US" dirty="0" smtClean="0"/>
-              <a:t>Type 2 Hypervisor</a:t>
-            </a:r>
-          </a:p>
-          <a:p>
-            <a:pPr lvl="2"/>
-            <a:r>
-              <a:rPr lang="en-US" dirty="0" smtClean="0"/>
-              <a:t>Runs on top of an operating system</a:t>
-            </a:r>
-          </a:p>
-          <a:p>
-            <a:pPr lvl="2"/>
-            <a:r>
-              <a:rPr lang="en-US" dirty="0" smtClean="0"/>
-              <a:t>Easy installation</a:t>
-            </a:r>
-          </a:p>
-          <a:p>
-            <a:pPr lvl="2"/>
-            <a:r>
-              <a:rPr lang="en-US" dirty="0" smtClean="0"/>
-              <a:t>Example: Oracle </a:t>
-            </a:r>
-            <a:r>
-              <a:rPr lang="en-US" dirty="0" err="1" smtClean="0"/>
-              <a:t>VirtualBox</a:t>
-            </a:r>
-            <a:r>
-              <a:rPr lang="en-US" dirty="0" smtClean="0"/>
-              <a:t>, </a:t>
-            </a:r>
-            <a:r>
-              <a:rPr lang="en-US" dirty="0" err="1" smtClean="0"/>
-              <a:t>VMWare</a:t>
-            </a:r>
-            <a:r>
-              <a:rPr lang="en-US" dirty="0" smtClean="0"/>
-              <a:t> Fusion</a:t>
-            </a:r>
-            <a:endParaRPr lang="en-US" dirty="0"/>
-          </a:p>
-          <a:p>
-            <a:pPr lvl="1"/>
-            <a:r>
-              <a:rPr lang="en-US" dirty="0" smtClean="0"/>
-              <a:t>Type 1 vs. Type 2</a:t>
-            </a:r>
-          </a:p>
-          <a:p>
-            <a:pPr lvl="2"/>
-            <a:r>
-              <a:rPr lang="en-US" dirty="0" smtClean="0"/>
-              <a:t>Type 1 provides higher performance &amp; security</a:t>
-            </a:r>
-          </a:p>
-          <a:p>
-            <a:pPr lvl="1"/>
-            <a:r>
-              <a:rPr lang="en-US" dirty="0" smtClean="0"/>
-              <a:t>Full virtualization vs. </a:t>
-            </a:r>
-            <a:r>
-              <a:rPr lang="en-US" dirty="0" err="1" smtClean="0"/>
-              <a:t>Paravirtualization</a:t>
-            </a:r>
+            <a:r>
+              <a:rPr lang="en-US" dirty="0" smtClean="0"/>
+              <a:t>Servers are turned into software</a:t>
+            </a:r>
+          </a:p>
+          <a:p>
+            <a:pPr lvl="1"/>
+            <a:r>
+              <a:rPr lang="en-US" dirty="0" smtClean="0"/>
+              <a:t>It’s easier to move software around</a:t>
+            </a:r>
+          </a:p>
+          <a:p>
+            <a:pPr lvl="1"/>
+            <a:r>
+              <a:rPr lang="en-US" dirty="0" smtClean="0"/>
+              <a:t>Easy to move a stack from an older physical server to a newer physical server</a:t>
+            </a:r>
+          </a:p>
+          <a:p>
+            <a:r>
+              <a:rPr lang="en-US" dirty="0" smtClean="0"/>
+              <a:t>No need to purchase a separate server for each customer because virtualization provides partitioning.</a:t>
+            </a:r>
+          </a:p>
+          <a:p>
+            <a:endParaRPr lang="en-US" dirty="0"/>
+          </a:p>
+          <a:p>
             <a:endParaRPr lang="en-US" dirty="0" smtClean="0"/>
           </a:p>
           <a:p>
-            <a:pPr lvl="2"/>
-            <a:r>
-              <a:rPr lang="en-US" dirty="0" smtClean="0"/>
-              <a:t>Full virtualization = guest operating systems are not “aware” that they are being virtualized</a:t>
-            </a:r>
-          </a:p>
-          <a:p>
-            <a:pPr lvl="2"/>
-            <a:r>
-              <a:rPr lang="en-US" dirty="0" smtClean="0"/>
-              <a:t>Para virtualization = guest operating system are “aware” of virtualization and have special kernel modifications (better performance than full virtualization)</a:t>
-            </a:r>
-          </a:p>
-          <a:p>
-            <a:pPr lvl="1"/>
+            <a:endParaRPr lang="en-US" dirty="0"/>
+          </a:p>
+          <a:p>
+            <a:pPr marL="0" indent="0">
+              <a:buNone/>
+            </a:pPr>
+            <a:endParaRPr lang="en-US" dirty="0"/>
+          </a:p>
+          <a:p>
             <a:endParaRPr lang="en-US" dirty="0" smtClean="0"/>
-          </a:p>
-          <a:p>
-            <a:pPr lvl="2"/>
-            <a:endParaRPr lang="en-US" dirty="0" smtClean="0"/>
-          </a:p>
-          <a:p>
-            <a:endParaRPr lang="en-US" dirty="0"/>
-          </a:p>
-          <a:p>
-            <a:pPr marL="0" indent="0">
-              <a:buNone/>
-            </a:pPr>
-            <a:endParaRPr lang="en-US" dirty="0"/>
-          </a:p>
-          <a:p>
-            <a:endParaRPr lang="en-US" dirty="0" smtClean="0"/>
-          </a:p>
-        </p:txBody>
-      </p:sp>
-      <p:sp>
-        <p:nvSpPr>
-          <p:cNvPr id="4" name="TextBox 3"/>
-          <p:cNvSpPr txBox="1"/>
-          <p:nvPr/>
-        </p:nvSpPr>
-        <p:spPr>
-          <a:xfrm>
-            <a:off x="3561365" y="4268655"/>
-            <a:ext cx="184666" cy="369332"/>
-          </a:xfrm>
-          <a:prstGeom prst="rect">
-            <a:avLst/>
-          </a:prstGeom>
-          <a:noFill/>
-        </p:spPr>
-        <p:txBody>
-          <a:bodyPr wrap="none" rtlCol="0">
-            <a:spAutoFit/>
-          </a:bodyPr>
-          <a:lstStyle/>
-          <a:p>
-            <a:endParaRPr lang="en-US" dirty="0"/>
           </a:p>
         </p:txBody>
       </p:sp>
     </p:spTree>
     <p:extLst>
       <p:ext uri="{BB962C8B-B14F-4D97-AF65-F5344CB8AC3E}">
-        <p14:creationId xmlns:p14="http://schemas.microsoft.com/office/powerpoint/2010/main" val="2526346320"/>
+        <p14:creationId xmlns:p14="http://schemas.microsoft.com/office/powerpoint/2010/main" val="2273451257"/>
       </p:ext>
     </p:extLst>
   </p:cSld>
@@ -7347,6 +7103,505 @@
         </p:spPr>
         <p:txBody>
           <a:bodyPr>
+            <a:normAutofit fontScale="92500" lnSpcReduction="10000"/>
+          </a:bodyPr>
+          <a:lstStyle/>
+          <a:p>
+            <a:r>
+              <a:rPr lang="en-US" dirty="0" smtClean="0"/>
+              <a:t>First, some definitions:</a:t>
+            </a:r>
+          </a:p>
+          <a:p>
+            <a:pPr lvl="1"/>
+            <a:r>
+              <a:rPr lang="en-US" dirty="0" smtClean="0"/>
+              <a:t>Host machine: physical server that supports multiple stacks</a:t>
+            </a:r>
+          </a:p>
+          <a:p>
+            <a:pPr lvl="1"/>
+            <a:r>
+              <a:rPr lang="en-US" dirty="0" smtClean="0"/>
+              <a:t>Virtual machine: virtualized server instance running on a host machine (also known as an instance)</a:t>
+            </a:r>
+          </a:p>
+          <a:p>
+            <a:pPr lvl="1"/>
+            <a:r>
+              <a:rPr lang="en-US" dirty="0" smtClean="0"/>
+              <a:t>Host OS: operating system running on a bare-metal server</a:t>
+            </a:r>
+          </a:p>
+          <a:p>
+            <a:pPr lvl="1"/>
+            <a:r>
+              <a:rPr lang="en-US" dirty="0" smtClean="0"/>
+              <a:t>Guest OS: operating system running on a virtual machine</a:t>
+            </a:r>
+          </a:p>
+          <a:p>
+            <a:pPr lvl="1"/>
+            <a:r>
+              <a:rPr lang="en-US" dirty="0" smtClean="0"/>
+              <a:t>Hypervisor: Software that emulates and manages the communication between virtual machines and the physical server</a:t>
+            </a:r>
+          </a:p>
+          <a:p>
+            <a:endParaRPr lang="en-US" dirty="0"/>
+          </a:p>
+          <a:p>
+            <a:endParaRPr lang="en-US" dirty="0" smtClean="0"/>
+          </a:p>
+          <a:p>
+            <a:endParaRPr lang="en-US" dirty="0"/>
+          </a:p>
+          <a:p>
+            <a:pPr marL="0" indent="0">
+              <a:buNone/>
+            </a:pPr>
+            <a:endParaRPr lang="en-US" dirty="0"/>
+          </a:p>
+          <a:p>
+            <a:endParaRPr lang="en-US" dirty="0" smtClean="0"/>
+          </a:p>
+        </p:txBody>
+      </p:sp>
+    </p:spTree>
+    <p:extLst>
+      <p:ext uri="{BB962C8B-B14F-4D97-AF65-F5344CB8AC3E}">
+        <p14:creationId xmlns:p14="http://schemas.microsoft.com/office/powerpoint/2010/main" val="3992047205"/>
+      </p:ext>
+    </p:extLst>
+  </p:cSld>
+  <p:clrMapOvr>
+    <a:masterClrMapping/>
+  </p:clrMapOvr>
+</p:sld>
+</file>
+
+<file path=ppt/slides/slide37.xml><?xml version="1.0" encoding="utf-8"?>
+<p:sld xmlns:a="http://schemas.openxmlformats.org/drawingml/2006/main" xmlns:r="http://schemas.openxmlformats.org/officeDocument/2006/relationships" xmlns:p="http://schemas.openxmlformats.org/presentationml/2006/main">
+  <p:cSld>
+    <p:spTree>
+      <p:nvGrpSpPr>
+        <p:cNvPr id="1" name=""/>
+        <p:cNvGrpSpPr/>
+        <p:nvPr/>
+      </p:nvGrpSpPr>
+      <p:grpSpPr>
+        <a:xfrm>
+          <a:off x="0" y="0"/>
+          <a:ext cx="0" cy="0"/>
+          <a:chOff x="0" y="0"/>
+          <a:chExt cx="0" cy="0"/>
+        </a:xfrm>
+      </p:grpSpPr>
+      <p:sp>
+        <p:nvSpPr>
+          <p:cNvPr id="2" name="Title 1"/>
+          <p:cNvSpPr>
+            <a:spLocks noGrp="1"/>
+          </p:cNvSpPr>
+          <p:nvPr>
+            <p:ph type="title"/>
+          </p:nvPr>
+        </p:nvSpPr>
+        <p:spPr/>
+        <p:txBody>
+          <a:bodyPr>
+            <a:normAutofit/>
+          </a:bodyPr>
+          <a:lstStyle/>
+          <a:p>
+            <a:r>
+              <a:rPr lang="en-US" dirty="0" smtClean="0"/>
+              <a:t>Virtualization Types</a:t>
+            </a:r>
+            <a:endParaRPr lang="en-US" dirty="0"/>
+          </a:p>
+        </p:txBody>
+      </p:sp>
+      <p:sp>
+        <p:nvSpPr>
+          <p:cNvPr id="3" name="Content Placeholder 2"/>
+          <p:cNvSpPr>
+            <a:spLocks noGrp="1"/>
+          </p:cNvSpPr>
+          <p:nvPr>
+            <p:ph idx="1"/>
+          </p:nvPr>
+        </p:nvSpPr>
+        <p:spPr>
+          <a:xfrm>
+            <a:off x="457200" y="1600200"/>
+            <a:ext cx="8229600" cy="4920629"/>
+          </a:xfrm>
+        </p:spPr>
+        <p:txBody>
+          <a:bodyPr>
+            <a:normAutofit/>
+          </a:bodyPr>
+          <a:lstStyle/>
+          <a:p>
+            <a:r>
+              <a:rPr lang="en-US" dirty="0" smtClean="0"/>
+              <a:t>Hardware virtualization</a:t>
+            </a:r>
+          </a:p>
+          <a:p>
+            <a:pPr lvl="1"/>
+            <a:r>
+              <a:rPr lang="en-US" dirty="0" smtClean="0"/>
+              <a:t>Part of physical server dedicated to a specific stack</a:t>
+            </a:r>
+          </a:p>
+          <a:p>
+            <a:pPr lvl="1"/>
+            <a:r>
+              <a:rPr lang="en-US" dirty="0" smtClean="0"/>
+              <a:t>Big expensive mainframe-type systems</a:t>
+            </a:r>
+          </a:p>
+          <a:p>
+            <a:r>
+              <a:rPr lang="en-US" dirty="0" smtClean="0"/>
+              <a:t>Software virtualization</a:t>
+            </a:r>
+          </a:p>
+          <a:p>
+            <a:pPr lvl="1"/>
+            <a:r>
+              <a:rPr lang="en-US" dirty="0" smtClean="0"/>
+              <a:t>Type 1 Hypervisor</a:t>
+            </a:r>
+          </a:p>
+          <a:p>
+            <a:pPr lvl="2"/>
+            <a:r>
+              <a:rPr lang="en-US" dirty="0" smtClean="0"/>
+              <a:t>Runs on top of the bare-metal server and sits between hardware and operating systems in the stacks</a:t>
+            </a:r>
+          </a:p>
+          <a:p>
+            <a:pPr lvl="2"/>
+            <a:r>
+              <a:rPr lang="en-US" dirty="0" smtClean="0"/>
+              <a:t>Examples: </a:t>
+            </a:r>
+            <a:r>
+              <a:rPr lang="en-US" dirty="0" err="1" smtClean="0"/>
+              <a:t>VMWare</a:t>
+            </a:r>
+            <a:r>
+              <a:rPr lang="en-US" dirty="0" smtClean="0"/>
+              <a:t> ESX, Microsoft Virtual Server, </a:t>
+            </a:r>
+            <a:r>
+              <a:rPr lang="en-US" dirty="0" err="1" smtClean="0"/>
+              <a:t>Xen</a:t>
+            </a:r>
+            <a:endParaRPr lang="en-US" dirty="0"/>
+          </a:p>
+          <a:p>
+            <a:endParaRPr lang="en-US" dirty="0" smtClean="0"/>
+          </a:p>
+          <a:p>
+            <a:endParaRPr lang="en-US" dirty="0"/>
+          </a:p>
+          <a:p>
+            <a:pPr marL="0" indent="0">
+              <a:buNone/>
+            </a:pPr>
+            <a:endParaRPr lang="en-US" dirty="0"/>
+          </a:p>
+          <a:p>
+            <a:endParaRPr lang="en-US" dirty="0" smtClean="0"/>
+          </a:p>
+        </p:txBody>
+      </p:sp>
+    </p:spTree>
+    <p:extLst>
+      <p:ext uri="{BB962C8B-B14F-4D97-AF65-F5344CB8AC3E}">
+        <p14:creationId xmlns:p14="http://schemas.microsoft.com/office/powerpoint/2010/main" val="4033828629"/>
+      </p:ext>
+    </p:extLst>
+  </p:cSld>
+  <p:clrMapOvr>
+    <a:masterClrMapping/>
+  </p:clrMapOvr>
+</p:sld>
+</file>
+
+<file path=ppt/slides/slide38.xml><?xml version="1.0" encoding="utf-8"?>
+<p:sld xmlns:a="http://schemas.openxmlformats.org/drawingml/2006/main" xmlns:r="http://schemas.openxmlformats.org/officeDocument/2006/relationships" xmlns:p="http://schemas.openxmlformats.org/presentationml/2006/main">
+  <p:cSld>
+    <p:spTree>
+      <p:nvGrpSpPr>
+        <p:cNvPr id="1" name=""/>
+        <p:cNvGrpSpPr/>
+        <p:nvPr/>
+      </p:nvGrpSpPr>
+      <p:grpSpPr>
+        <a:xfrm>
+          <a:off x="0" y="0"/>
+          <a:ext cx="0" cy="0"/>
+          <a:chOff x="0" y="0"/>
+          <a:chExt cx="0" cy="0"/>
+        </a:xfrm>
+      </p:grpSpPr>
+      <p:sp>
+        <p:nvSpPr>
+          <p:cNvPr id="2" name="Title 1"/>
+          <p:cNvSpPr>
+            <a:spLocks noGrp="1"/>
+          </p:cNvSpPr>
+          <p:nvPr>
+            <p:ph type="title"/>
+          </p:nvPr>
+        </p:nvSpPr>
+        <p:spPr/>
+        <p:txBody>
+          <a:bodyPr>
+            <a:normAutofit/>
+          </a:bodyPr>
+          <a:lstStyle/>
+          <a:p>
+            <a:r>
+              <a:rPr lang="en-US" dirty="0" smtClean="0"/>
+              <a:t>Virtualization Types</a:t>
+            </a:r>
+            <a:endParaRPr lang="en-US" dirty="0"/>
+          </a:p>
+        </p:txBody>
+      </p:sp>
+      <p:sp>
+        <p:nvSpPr>
+          <p:cNvPr id="3" name="Content Placeholder 2"/>
+          <p:cNvSpPr>
+            <a:spLocks noGrp="1"/>
+          </p:cNvSpPr>
+          <p:nvPr>
+            <p:ph idx="1"/>
+          </p:nvPr>
+        </p:nvSpPr>
+        <p:spPr>
+          <a:xfrm>
+            <a:off x="457200" y="1600200"/>
+            <a:ext cx="8229600" cy="4920629"/>
+          </a:xfrm>
+        </p:spPr>
+        <p:txBody>
+          <a:bodyPr>
+            <a:normAutofit fontScale="92500"/>
+          </a:bodyPr>
+          <a:lstStyle/>
+          <a:p>
+            <a:pPr lvl="1"/>
+            <a:r>
+              <a:rPr lang="en-US" dirty="0" smtClean="0"/>
+              <a:t>Type 2 Hypervisor</a:t>
+            </a:r>
+          </a:p>
+          <a:p>
+            <a:pPr lvl="2"/>
+            <a:r>
+              <a:rPr lang="en-US" dirty="0" smtClean="0"/>
+              <a:t>Runs on top of an operating system</a:t>
+            </a:r>
+          </a:p>
+          <a:p>
+            <a:pPr lvl="2"/>
+            <a:r>
+              <a:rPr lang="en-US" dirty="0" smtClean="0"/>
+              <a:t>Easy installation</a:t>
+            </a:r>
+          </a:p>
+          <a:p>
+            <a:pPr lvl="2"/>
+            <a:r>
+              <a:rPr lang="en-US" dirty="0" smtClean="0"/>
+              <a:t>Example: Oracle </a:t>
+            </a:r>
+            <a:r>
+              <a:rPr lang="en-US" dirty="0" err="1" smtClean="0"/>
+              <a:t>VirtualBox</a:t>
+            </a:r>
+            <a:r>
+              <a:rPr lang="en-US" dirty="0" smtClean="0"/>
+              <a:t>, </a:t>
+            </a:r>
+            <a:r>
+              <a:rPr lang="en-US" dirty="0" err="1" smtClean="0"/>
+              <a:t>VMWare</a:t>
+            </a:r>
+            <a:r>
+              <a:rPr lang="en-US" dirty="0" smtClean="0"/>
+              <a:t> Fusion</a:t>
+            </a:r>
+            <a:endParaRPr lang="en-US" dirty="0"/>
+          </a:p>
+          <a:p>
+            <a:pPr lvl="1"/>
+            <a:r>
+              <a:rPr lang="en-US" dirty="0" smtClean="0"/>
+              <a:t>Type 1 vs. Type 2</a:t>
+            </a:r>
+          </a:p>
+          <a:p>
+            <a:pPr lvl="2"/>
+            <a:r>
+              <a:rPr lang="en-US" dirty="0" smtClean="0"/>
+              <a:t>Type 1 provides higher performance &amp; security</a:t>
+            </a:r>
+          </a:p>
+          <a:p>
+            <a:pPr lvl="1"/>
+            <a:r>
+              <a:rPr lang="en-US" dirty="0" smtClean="0"/>
+              <a:t>Full virtualization vs. </a:t>
+            </a:r>
+            <a:r>
+              <a:rPr lang="en-US" dirty="0" err="1" smtClean="0"/>
+              <a:t>Paravirtualization</a:t>
+            </a:r>
+            <a:endParaRPr lang="en-US" dirty="0" smtClean="0"/>
+          </a:p>
+          <a:p>
+            <a:pPr lvl="2"/>
+            <a:r>
+              <a:rPr lang="en-US" dirty="0" smtClean="0"/>
+              <a:t>Full virtualization = guest operating systems are not “aware” that they are being virtualized</a:t>
+            </a:r>
+          </a:p>
+          <a:p>
+            <a:pPr lvl="2"/>
+            <a:r>
+              <a:rPr lang="en-US" dirty="0" smtClean="0"/>
+              <a:t>Para virtualization = guest operating system are “aware” of virtualization and have special kernel modifications (better performance than full virtualization)</a:t>
+            </a:r>
+          </a:p>
+          <a:p>
+            <a:pPr lvl="1"/>
+            <a:endParaRPr lang="en-US" dirty="0" smtClean="0"/>
+          </a:p>
+          <a:p>
+            <a:pPr lvl="2"/>
+            <a:endParaRPr lang="en-US" dirty="0" smtClean="0"/>
+          </a:p>
+          <a:p>
+            <a:endParaRPr lang="en-US" dirty="0"/>
+          </a:p>
+          <a:p>
+            <a:pPr marL="0" indent="0">
+              <a:buNone/>
+            </a:pPr>
+            <a:endParaRPr lang="en-US" dirty="0"/>
+          </a:p>
+          <a:p>
+            <a:endParaRPr lang="en-US" dirty="0" smtClean="0"/>
+          </a:p>
+        </p:txBody>
+      </p:sp>
+      <p:sp>
+        <p:nvSpPr>
+          <p:cNvPr id="4" name="TextBox 3"/>
+          <p:cNvSpPr txBox="1"/>
+          <p:nvPr/>
+        </p:nvSpPr>
+        <p:spPr>
+          <a:xfrm>
+            <a:off x="3561365" y="4268655"/>
+            <a:ext cx="184666" cy="369332"/>
+          </a:xfrm>
+          <a:prstGeom prst="rect">
+            <a:avLst/>
+          </a:prstGeom>
+          <a:noFill/>
+        </p:spPr>
+        <p:txBody>
+          <a:bodyPr wrap="none" rtlCol="0">
+            <a:spAutoFit/>
+          </a:bodyPr>
+          <a:lstStyle/>
+          <a:p>
+            <a:endParaRPr lang="en-US" dirty="0"/>
+          </a:p>
+        </p:txBody>
+      </p:sp>
+    </p:spTree>
+    <p:extLst>
+      <p:ext uri="{BB962C8B-B14F-4D97-AF65-F5344CB8AC3E}">
+        <p14:creationId xmlns:p14="http://schemas.microsoft.com/office/powerpoint/2010/main" val="2526346320"/>
+      </p:ext>
+    </p:extLst>
+  </p:cSld>
+  <p:clrMapOvr>
+    <a:masterClrMapping/>
+  </p:clrMapOvr>
+</p:sld>
+</file>
+
+<file path=ppt/slides/slide39.xml><?xml version="1.0" encoding="utf-8"?>
+<p:sld xmlns:a="http://schemas.openxmlformats.org/drawingml/2006/main" xmlns:r="http://schemas.openxmlformats.org/officeDocument/2006/relationships" xmlns:p="http://schemas.openxmlformats.org/presentationml/2006/main">
+  <p:cSld>
+    <p:spTree>
+      <p:nvGrpSpPr>
+        <p:cNvPr id="1" name=""/>
+        <p:cNvGrpSpPr/>
+        <p:nvPr/>
+      </p:nvGrpSpPr>
+      <p:grpSpPr>
+        <a:xfrm>
+          <a:off x="0" y="0"/>
+          <a:ext cx="0" cy="0"/>
+          <a:chOff x="0" y="0"/>
+          <a:chExt cx="0" cy="0"/>
+        </a:xfrm>
+      </p:grpSpPr>
+      <p:sp>
+        <p:nvSpPr>
+          <p:cNvPr id="2" name="Title 1"/>
+          <p:cNvSpPr>
+            <a:spLocks noGrp="1"/>
+          </p:cNvSpPr>
+          <p:nvPr>
+            <p:ph type="title"/>
+          </p:nvPr>
+        </p:nvSpPr>
+        <p:spPr/>
+        <p:txBody>
+          <a:bodyPr>
+            <a:normAutofit/>
+          </a:bodyPr>
+          <a:lstStyle/>
+          <a:p>
+            <a:r>
+              <a:rPr lang="en-US" dirty="0" smtClean="0"/>
+              <a:t>Virtualization Types</a:t>
+            </a:r>
+            <a:endParaRPr lang="en-US" dirty="0"/>
+          </a:p>
+        </p:txBody>
+      </p:sp>
+      <p:sp>
+        <p:nvSpPr>
+          <p:cNvPr id="3" name="Content Placeholder 2"/>
+          <p:cNvSpPr>
+            <a:spLocks noGrp="1"/>
+          </p:cNvSpPr>
+          <p:nvPr>
+            <p:ph idx="1"/>
+          </p:nvPr>
+        </p:nvSpPr>
+        <p:spPr>
+          <a:xfrm>
+            <a:off x="457200" y="1600200"/>
+            <a:ext cx="8229600" cy="4920629"/>
+          </a:xfrm>
+        </p:spPr>
+        <p:txBody>
+          <a:bodyPr>
             <a:normAutofit/>
           </a:bodyPr>
           <a:lstStyle/>
@@ -7453,7 +7708,139 @@
 </p:sld>
 </file>
 
-<file path=ppt/slides/slide37.xml><?xml version="1.0" encoding="utf-8"?>
+<file path=ppt/slides/slide4.xml><?xml version="1.0" encoding="utf-8"?>
+<p:sld xmlns:a="http://schemas.openxmlformats.org/drawingml/2006/main" xmlns:r="http://schemas.openxmlformats.org/officeDocument/2006/relationships" xmlns:p="http://schemas.openxmlformats.org/presentationml/2006/main">
+  <p:cSld>
+    <p:spTree>
+      <p:nvGrpSpPr>
+        <p:cNvPr id="1" name=""/>
+        <p:cNvGrpSpPr/>
+        <p:nvPr/>
+      </p:nvGrpSpPr>
+      <p:grpSpPr>
+        <a:xfrm>
+          <a:off x="0" y="0"/>
+          <a:ext cx="0" cy="0"/>
+          <a:chOff x="0" y="0"/>
+          <a:chExt cx="0" cy="0"/>
+        </a:xfrm>
+      </p:grpSpPr>
+      <p:sp>
+        <p:nvSpPr>
+          <p:cNvPr id="2" name="Title 1"/>
+          <p:cNvSpPr>
+            <a:spLocks noGrp="1"/>
+          </p:cNvSpPr>
+          <p:nvPr>
+            <p:ph type="title"/>
+          </p:nvPr>
+        </p:nvSpPr>
+        <p:spPr/>
+        <p:txBody>
+          <a:bodyPr/>
+          <a:lstStyle/>
+          <a:p>
+            <a:r>
+              <a:rPr lang="en-US" dirty="0" smtClean="0"/>
+              <a:t>Distributed infrastructure</a:t>
+            </a:r>
+            <a:endParaRPr lang="en-US" dirty="0"/>
+          </a:p>
+        </p:txBody>
+      </p:sp>
+      <p:sp>
+        <p:nvSpPr>
+          <p:cNvPr id="3" name="Content Placeholder 2"/>
+          <p:cNvSpPr>
+            <a:spLocks noGrp="1"/>
+          </p:cNvSpPr>
+          <p:nvPr>
+            <p:ph idx="1"/>
+          </p:nvPr>
+        </p:nvSpPr>
+        <p:spPr/>
+        <p:txBody>
+          <a:bodyPr/>
+          <a:lstStyle/>
+          <a:p>
+            <a:r>
+              <a:rPr lang="en-US" dirty="0" smtClean="0"/>
+              <a:t>Let’s look at where we’ve been</a:t>
+            </a:r>
+          </a:p>
+          <a:p>
+            <a:pPr lvl="2"/>
+            <a:r>
+              <a:rPr lang="en-US" dirty="0" smtClean="0"/>
+              <a:t>Mainframes presenting applications via direct terminals</a:t>
+            </a:r>
+          </a:p>
+          <a:p>
+            <a:pPr lvl="2"/>
+            <a:r>
+              <a:rPr lang="en-US" dirty="0" smtClean="0"/>
+              <a:t>Personal computers running desktop applications</a:t>
+            </a:r>
+          </a:p>
+          <a:p>
+            <a:pPr lvl="2"/>
+            <a:r>
+              <a:rPr lang="en-US" dirty="0" smtClean="0"/>
+              <a:t>Client-server applications (thick client &lt;-&gt; database)</a:t>
+            </a:r>
+          </a:p>
+          <a:p>
+            <a:pPr lvl="2"/>
+            <a:r>
+              <a:rPr lang="en-US" dirty="0" smtClean="0"/>
+              <a:t>Web applications (thin client &lt;-&gt; </a:t>
+            </a:r>
+            <a:r>
+              <a:rPr lang="en-US" dirty="0" err="1" smtClean="0"/>
+              <a:t>middleware+db</a:t>
+            </a:r>
+            <a:r>
+              <a:rPr lang="en-US" dirty="0" smtClean="0"/>
+              <a:t>)</a:t>
+            </a:r>
+          </a:p>
+          <a:p>
+            <a:pPr lvl="2"/>
+            <a:r>
+              <a:rPr lang="en-US" dirty="0" smtClean="0"/>
+              <a:t>Distributed applications (highly scaled in the cloud)</a:t>
+            </a:r>
+          </a:p>
+          <a:p>
+            <a:pPr lvl="2"/>
+            <a:endParaRPr lang="en-US" dirty="0" smtClean="0"/>
+          </a:p>
+          <a:p>
+            <a:r>
+              <a:rPr lang="en-US" dirty="0" smtClean="0"/>
+              <a:t>Distributed apps are broken into small components which can be individually scaled</a:t>
+            </a:r>
+          </a:p>
+          <a:p>
+            <a:pPr lvl="2"/>
+            <a:endParaRPr lang="en-US" dirty="0" smtClean="0"/>
+          </a:p>
+        </p:txBody>
+      </p:sp>
+    </p:spTree>
+    <p:extLst>
+      <p:ext uri="{BB962C8B-B14F-4D97-AF65-F5344CB8AC3E}">
+        <p14:creationId xmlns:p14="http://schemas.microsoft.com/office/powerpoint/2010/main" val="3242115394"/>
+      </p:ext>
+    </p:extLst>
+  </p:cSld>
+  <p:clrMapOvr>
+    <a:masterClrMapping/>
+  </p:clrMapOvr>
+</p:sld>
+</file>
+
+<file path=ppt/slides/slide40.xml><?xml version="1.0" encoding="utf-8"?>
 <p:sld xmlns:a="http://schemas.openxmlformats.org/drawingml/2006/main" xmlns:r="http://schemas.openxmlformats.org/officeDocument/2006/relationships" xmlns:p="http://schemas.openxmlformats.org/presentationml/2006/main">
   <p:cSld>
     <p:spTree>
@@ -7605,7 +7992,7 @@
 </p:sld>
 </file>
 
-<file path=ppt/slides/slide38.xml><?xml version="1.0" encoding="utf-8"?>
+<file path=ppt/slides/slide41.xml><?xml version="1.0" encoding="utf-8"?>
 <p:sld xmlns:a="http://schemas.openxmlformats.org/drawingml/2006/main" xmlns:r="http://schemas.openxmlformats.org/officeDocument/2006/relationships" xmlns:p="http://schemas.openxmlformats.org/presentationml/2006/main">
   <p:cSld>
     <p:spTree>
@@ -7748,7 +8135,7 @@
 </p:sld>
 </file>
 
-<file path=ppt/slides/slide39.xml><?xml version="1.0" encoding="utf-8"?>
+<file path=ppt/slides/slide42.xml><?xml version="1.0" encoding="utf-8"?>
 <p:sld xmlns:a="http://schemas.openxmlformats.org/drawingml/2006/main" xmlns:r="http://schemas.openxmlformats.org/officeDocument/2006/relationships" xmlns:p="http://schemas.openxmlformats.org/presentationml/2006/main">
   <p:cSld>
     <p:spTree>
@@ -7904,139 +8291,7 @@
 </p:sld>
 </file>
 
-<file path=ppt/slides/slide4.xml><?xml version="1.0" encoding="utf-8"?>
-<p:sld xmlns:a="http://schemas.openxmlformats.org/drawingml/2006/main" xmlns:r="http://schemas.openxmlformats.org/officeDocument/2006/relationships" xmlns:p="http://schemas.openxmlformats.org/presentationml/2006/main">
-  <p:cSld>
-    <p:spTree>
-      <p:nvGrpSpPr>
-        <p:cNvPr id="1" name=""/>
-        <p:cNvGrpSpPr/>
-        <p:nvPr/>
-      </p:nvGrpSpPr>
-      <p:grpSpPr>
-        <a:xfrm>
-          <a:off x="0" y="0"/>
-          <a:ext cx="0" cy="0"/>
-          <a:chOff x="0" y="0"/>
-          <a:chExt cx="0" cy="0"/>
-        </a:xfrm>
-      </p:grpSpPr>
-      <p:sp>
-        <p:nvSpPr>
-          <p:cNvPr id="2" name="Title 1"/>
-          <p:cNvSpPr>
-            <a:spLocks noGrp="1"/>
-          </p:cNvSpPr>
-          <p:nvPr>
-            <p:ph type="title"/>
-          </p:nvPr>
-        </p:nvSpPr>
-        <p:spPr/>
-        <p:txBody>
-          <a:bodyPr/>
-          <a:lstStyle/>
-          <a:p>
-            <a:r>
-              <a:rPr lang="en-US" dirty="0" smtClean="0"/>
-              <a:t>Distributed infrastructure</a:t>
-            </a:r>
-            <a:endParaRPr lang="en-US" dirty="0"/>
-          </a:p>
-        </p:txBody>
-      </p:sp>
-      <p:sp>
-        <p:nvSpPr>
-          <p:cNvPr id="3" name="Content Placeholder 2"/>
-          <p:cNvSpPr>
-            <a:spLocks noGrp="1"/>
-          </p:cNvSpPr>
-          <p:nvPr>
-            <p:ph idx="1"/>
-          </p:nvPr>
-        </p:nvSpPr>
-        <p:spPr/>
-        <p:txBody>
-          <a:bodyPr/>
-          <a:lstStyle/>
-          <a:p>
-            <a:r>
-              <a:rPr lang="en-US" dirty="0" smtClean="0"/>
-              <a:t>Let’s look at where we’ve been</a:t>
-            </a:r>
-          </a:p>
-          <a:p>
-            <a:pPr lvl="2"/>
-            <a:r>
-              <a:rPr lang="en-US" dirty="0" smtClean="0"/>
-              <a:t>Mainframes presenting applications via direct terminals</a:t>
-            </a:r>
-          </a:p>
-          <a:p>
-            <a:pPr lvl="2"/>
-            <a:r>
-              <a:rPr lang="en-US" dirty="0" smtClean="0"/>
-              <a:t>Personal computers running desktop applications</a:t>
-            </a:r>
-          </a:p>
-          <a:p>
-            <a:pPr lvl="2"/>
-            <a:r>
-              <a:rPr lang="en-US" dirty="0" smtClean="0"/>
-              <a:t>Client-server applications (thick client &lt;-&gt; database)</a:t>
-            </a:r>
-          </a:p>
-          <a:p>
-            <a:pPr lvl="2"/>
-            <a:r>
-              <a:rPr lang="en-US" dirty="0" smtClean="0"/>
-              <a:t>Web applications (thin client &lt;-&gt; </a:t>
-            </a:r>
-            <a:r>
-              <a:rPr lang="en-US" dirty="0" err="1" smtClean="0"/>
-              <a:t>middleware+db</a:t>
-            </a:r>
-            <a:r>
-              <a:rPr lang="en-US" dirty="0" smtClean="0"/>
-              <a:t>)</a:t>
-            </a:r>
-          </a:p>
-          <a:p>
-            <a:pPr lvl="2"/>
-            <a:r>
-              <a:rPr lang="en-US" dirty="0" smtClean="0"/>
-              <a:t>Distributed applications (highly scaled in the cloud)</a:t>
-            </a:r>
-          </a:p>
-          <a:p>
-            <a:pPr lvl="2"/>
-            <a:endParaRPr lang="en-US" dirty="0" smtClean="0"/>
-          </a:p>
-          <a:p>
-            <a:r>
-              <a:rPr lang="en-US" dirty="0" smtClean="0"/>
-              <a:t>Distributed apps are broken into small components which can be individually scaled</a:t>
-            </a:r>
-          </a:p>
-          <a:p>
-            <a:pPr lvl="2"/>
-            <a:endParaRPr lang="en-US" dirty="0" smtClean="0"/>
-          </a:p>
-        </p:txBody>
-      </p:sp>
-    </p:spTree>
-    <p:extLst>
-      <p:ext uri="{BB962C8B-B14F-4D97-AF65-F5344CB8AC3E}">
-        <p14:creationId xmlns:p14="http://schemas.microsoft.com/office/powerpoint/2010/main" val="3242115394"/>
-      </p:ext>
-    </p:extLst>
-  </p:cSld>
-  <p:clrMapOvr>
-    <a:masterClrMapping/>
-  </p:clrMapOvr>
-</p:sld>
-</file>
-
-<file path=ppt/slides/slide40.xml><?xml version="1.0" encoding="utf-8"?>
+<file path=ppt/slides/slide43.xml><?xml version="1.0" encoding="utf-8"?>
 <p:sld xmlns:a="http://schemas.openxmlformats.org/drawingml/2006/main" xmlns:r="http://schemas.openxmlformats.org/officeDocument/2006/relationships" xmlns:p="http://schemas.openxmlformats.org/presentationml/2006/main">
   <p:cSld>
     <p:spTree>
@@ -8135,7 +8390,7 @@
 </p:sld>
 </file>
 
-<file path=ppt/slides/slide41.xml><?xml version="1.0" encoding="utf-8"?>
+<file path=ppt/slides/slide44.xml><?xml version="1.0" encoding="utf-8"?>
 <p:sld xmlns:a="http://schemas.openxmlformats.org/drawingml/2006/main" xmlns:r="http://schemas.openxmlformats.org/officeDocument/2006/relationships" xmlns:p="http://schemas.openxmlformats.org/presentationml/2006/main">
   <p:cSld>
     <p:spTree>
@@ -8255,7 +8510,7 @@
 </p:sld>
 </file>
 
-<file path=ppt/slides/slide42.xml><?xml version="1.0" encoding="utf-8"?>
+<file path=ppt/slides/slide45.xml><?xml version="1.0" encoding="utf-8"?>
 <p:sld xmlns:a="http://schemas.openxmlformats.org/drawingml/2006/main" xmlns:r="http://schemas.openxmlformats.org/officeDocument/2006/relationships" xmlns:p="http://schemas.openxmlformats.org/presentationml/2006/main">
   <p:cSld>
     <p:spTree>
@@ -8289,11 +8544,7 @@
           <a:p>
             <a:r>
               <a:rPr lang="en-US" dirty="0" smtClean="0"/>
-              <a:t>Vagrant </a:t>
-            </a:r>
-            <a:r>
-              <a:rPr lang="en-US" dirty="0" smtClean="0"/>
-              <a:t>architecture</a:t>
+              <a:t>Vagrant architecture</a:t>
             </a:r>
             <a:endParaRPr lang="en-US" dirty="0"/>
           </a:p>
@@ -8336,7 +8587,7 @@
 </p:sld>
 </file>
 
-<file path=ppt/slides/slide43.xml><?xml version="1.0" encoding="utf-8"?>
+<file path=ppt/slides/slide46.xml><?xml version="1.0" encoding="utf-8"?>
 <p:sld xmlns:a="http://schemas.openxmlformats.org/drawingml/2006/main" xmlns:r="http://schemas.openxmlformats.org/officeDocument/2006/relationships" xmlns:p="http://schemas.openxmlformats.org/presentationml/2006/main">
   <p:cSld>
     <p:spTree>
@@ -8370,11 +8621,7 @@
           <a:p>
             <a:r>
               <a:rPr lang="en-US" dirty="0" smtClean="0"/>
-              <a:t>Vagrant Hands</a:t>
-            </a:r>
-            <a:r>
-              <a:rPr lang="en-US" dirty="0" smtClean="0"/>
-              <a:t>-on</a:t>
+              <a:t>Vagrant Hands-on</a:t>
             </a:r>
             <a:endParaRPr lang="en-US" dirty="0"/>
           </a:p>
@@ -8439,7 +8686,7 @@
 </p:sld>
 </file>
 
-<file path=ppt/slides/slide44.xml><?xml version="1.0" encoding="utf-8"?>
+<file path=ppt/slides/slide47.xml><?xml version="1.0" encoding="utf-8"?>
 <p:sld xmlns:a="http://schemas.openxmlformats.org/drawingml/2006/main" xmlns:r="http://schemas.openxmlformats.org/officeDocument/2006/relationships" xmlns:p="http://schemas.openxmlformats.org/presentationml/2006/main">
   <p:cSld>
     <p:spTree>

</xml_diff>